<commit_message>
Relationships: Empty collections: - edits - minor changes to figure.
</commit_message>
<xml_diff>
--- a/part1/Figures/collections/inside-empty.pptx
+++ b/part1/Figures/collections/inside-empty.pptx
@@ -185,11 +185,14 @@
           <a:bodyPr vert="horz" lIns="91440" tIns="45720" rIns="91440" bIns="45720" rtlCol="0"/>
           <a:lstStyle>
             <a:lvl1pPr algn="l">
-              <a:defRPr sz="1200"/>
+              <a:defRPr sz="1200" dirty="0"/>
             </a:lvl1pPr>
           </a:lstStyle>
           <a:p>
-            <a:endParaRPr lang="en-US" dirty="0"/>
+            <a:pPr>
+              <a:defRPr/>
+            </a:pPr>
+            <a:endParaRPr lang="en-US"/>
           </a:p>
         </p:txBody>
       </p:sp>
@@ -216,13 +219,19 @@
           <a:bodyPr vert="horz" lIns="91440" tIns="45720" rIns="91440" bIns="45720" rtlCol="0"/>
           <a:lstStyle>
             <a:lvl1pPr algn="r">
-              <a:defRPr sz="1200"/>
+              <a:defRPr sz="1200" smtClean="0"/>
             </a:lvl1pPr>
           </a:lstStyle>
           <a:p>
-            <a:fld id="{63399E6A-A389-3547-948A-FA1167BEF3D4}" type="datetimeFigureOut">
-              <a:rPr lang="en-US" smtClean="0"/>
-              <a:t>7/6/12</a:t>
+            <a:pPr>
+              <a:defRPr/>
+            </a:pPr>
+            <a:fld id="{F09904DC-5009-483D-9B17-0387E002608D}" type="datetimeFigureOut">
+              <a:rPr lang="en-US"/>
+              <a:pPr>
+                <a:defRPr/>
+              </a:pPr>
+              <a:t>8/13/2012</a:t>
             </a:fld>
             <a:endParaRPr lang="en-US" dirty="0"/>
           </a:p>
@@ -257,7 +266,8 @@
           <a:bodyPr vert="horz" lIns="91440" tIns="45720" rIns="91440" bIns="45720" rtlCol="0" anchor="ctr"/>
           <a:lstStyle/>
           <a:p>
-            <a:endParaRPr lang="en-US" dirty="0"/>
+            <a:pPr lvl="0"/>
+            <a:endParaRPr lang="en-US" noProof="0" dirty="0"/>
           </a:p>
         </p:txBody>
       </p:sp>
@@ -286,38 +296,38 @@
           <a:p>
             <a:pPr lvl="0"/>
             <a:r>
-              <a:rPr lang="en-US" smtClean="0"/>
+              <a:rPr lang="en-US" noProof="0" smtClean="0"/>
               <a:t>Click to edit Master text styles</a:t>
             </a:r>
           </a:p>
           <a:p>
             <a:pPr lvl="1"/>
             <a:r>
-              <a:rPr lang="en-US" smtClean="0"/>
+              <a:rPr lang="en-US" noProof="0" smtClean="0"/>
               <a:t>Second level</a:t>
             </a:r>
           </a:p>
           <a:p>
             <a:pPr lvl="2"/>
             <a:r>
-              <a:rPr lang="en-US" smtClean="0"/>
+              <a:rPr lang="en-US" noProof="0" smtClean="0"/>
               <a:t>Third level</a:t>
             </a:r>
           </a:p>
           <a:p>
             <a:pPr lvl="3"/>
             <a:r>
-              <a:rPr lang="en-US" smtClean="0"/>
+              <a:rPr lang="en-US" noProof="0" smtClean="0"/>
               <a:t>Fourth level</a:t>
             </a:r>
           </a:p>
           <a:p>
             <a:pPr lvl="4"/>
             <a:r>
-              <a:rPr lang="en-US" smtClean="0"/>
+              <a:rPr lang="en-US" noProof="0" smtClean="0"/>
               <a:t>Fifth level</a:t>
             </a:r>
-            <a:endParaRPr lang="en-US"/>
+            <a:endParaRPr lang="en-US" noProof="0"/>
           </a:p>
         </p:txBody>
       </p:sp>
@@ -344,11 +354,14 @@
           <a:bodyPr vert="horz" lIns="91440" tIns="45720" rIns="91440" bIns="45720" rtlCol="0" anchor="b"/>
           <a:lstStyle>
             <a:lvl1pPr algn="l">
-              <a:defRPr sz="1200"/>
+              <a:defRPr sz="1200" dirty="0"/>
             </a:lvl1pPr>
           </a:lstStyle>
           <a:p>
-            <a:endParaRPr lang="en-US" dirty="0"/>
+            <a:pPr>
+              <a:defRPr/>
+            </a:pPr>
+            <a:endParaRPr lang="en-US"/>
           </a:p>
         </p:txBody>
       </p:sp>
@@ -375,12 +388,18 @@
           <a:bodyPr vert="horz" lIns="91440" tIns="45720" rIns="91440" bIns="45720" rtlCol="0" anchor="b"/>
           <a:lstStyle>
             <a:lvl1pPr algn="r">
-              <a:defRPr sz="1200"/>
+              <a:defRPr sz="1200" smtClean="0"/>
             </a:lvl1pPr>
           </a:lstStyle>
           <a:p>
-            <a:fld id="{26E6EE75-3F2A-9041-8B1A-2272835C97F9}" type="slidenum">
-              <a:rPr lang="en-US" smtClean="0"/>
+            <a:pPr>
+              <a:defRPr/>
+            </a:pPr>
+            <a:fld id="{9C0FB4A7-B3EC-4A9A-9EC1-77E36F549EEB}" type="slidenum">
+              <a:rPr lang="en-US"/>
+              <a:pPr>
+                <a:defRPr/>
+              </a:pPr>
               <a:t>‹#›</a:t>
             </a:fld>
             <a:endParaRPr lang="en-US" dirty="0"/>
@@ -388,15 +407,16 @@
         </p:txBody>
       </p:sp>
     </p:spTree>
-    <p:extLst>
-      <p:ext uri="{BB962C8B-B14F-4D97-AF65-F5344CB8AC3E}">
-        <p14:creationId xmlns:p14="http://schemas.microsoft.com/office/powerpoint/2010/main" val="1933097513"/>
-      </p:ext>
-    </p:extLst>
   </p:cSld>
   <p:clrMap bg1="lt1" tx1="dk1" bg2="lt2" tx2="dk2" accent1="accent1" accent2="accent2" accent3="accent3" accent4="accent4" accent5="accent5" accent6="accent6" hlink="hlink" folHlink="folHlink"/>
   <p:notesStyle>
-    <a:lvl1pPr marL="0" algn="l" defTabSz="457200" rtl="0" eaLnBrk="1" latinLnBrk="0" hangingPunct="1">
+    <a:lvl1pPr algn="l" defTabSz="457200" rtl="0" fontAlgn="base">
+      <a:spcBef>
+        <a:spcPct val="30000"/>
+      </a:spcBef>
+      <a:spcAft>
+        <a:spcPct val="0"/>
+      </a:spcAft>
       <a:defRPr sz="1200" kern="1200">
         <a:solidFill>
           <a:schemeClr val="tx1"/>
@@ -406,7 +426,13 @@
         <a:cs typeface="+mn-cs"/>
       </a:defRPr>
     </a:lvl1pPr>
-    <a:lvl2pPr marL="457200" algn="l" defTabSz="457200" rtl="0" eaLnBrk="1" latinLnBrk="0" hangingPunct="1">
+    <a:lvl2pPr marL="457200" algn="l" defTabSz="457200" rtl="0" fontAlgn="base">
+      <a:spcBef>
+        <a:spcPct val="30000"/>
+      </a:spcBef>
+      <a:spcAft>
+        <a:spcPct val="0"/>
+      </a:spcAft>
       <a:defRPr sz="1200" kern="1200">
         <a:solidFill>
           <a:schemeClr val="tx1"/>
@@ -416,7 +442,13 @@
         <a:cs typeface="+mn-cs"/>
       </a:defRPr>
     </a:lvl2pPr>
-    <a:lvl3pPr marL="914400" algn="l" defTabSz="457200" rtl="0" eaLnBrk="1" latinLnBrk="0" hangingPunct="1">
+    <a:lvl3pPr marL="914400" algn="l" defTabSz="457200" rtl="0" fontAlgn="base">
+      <a:spcBef>
+        <a:spcPct val="30000"/>
+      </a:spcBef>
+      <a:spcAft>
+        <a:spcPct val="0"/>
+      </a:spcAft>
       <a:defRPr sz="1200" kern="1200">
         <a:solidFill>
           <a:schemeClr val="tx1"/>
@@ -426,7 +458,13 @@
         <a:cs typeface="+mn-cs"/>
       </a:defRPr>
     </a:lvl3pPr>
-    <a:lvl4pPr marL="1371600" algn="l" defTabSz="457200" rtl="0" eaLnBrk="1" latinLnBrk="0" hangingPunct="1">
+    <a:lvl4pPr marL="1371600" algn="l" defTabSz="457200" rtl="0" fontAlgn="base">
+      <a:spcBef>
+        <a:spcPct val="30000"/>
+      </a:spcBef>
+      <a:spcAft>
+        <a:spcPct val="0"/>
+      </a:spcAft>
       <a:defRPr sz="1200" kern="1200">
         <a:solidFill>
           <a:schemeClr val="tx1"/>
@@ -436,7 +474,13 @@
         <a:cs typeface="+mn-cs"/>
       </a:defRPr>
     </a:lvl4pPr>
-    <a:lvl5pPr marL="1828800" algn="l" defTabSz="457200" rtl="0" eaLnBrk="1" latinLnBrk="0" hangingPunct="1">
+    <a:lvl5pPr marL="1828800" algn="l" defTabSz="457200" rtl="0" fontAlgn="base">
+      <a:spcBef>
+        <a:spcPct val="30000"/>
+      </a:spcBef>
+      <a:spcAft>
+        <a:spcPct val="0"/>
+      </a:spcAft>
       <a:defRPr sz="1200" kern="1200">
         <a:solidFill>
           <a:schemeClr val="tx1"/>
@@ -509,7 +553,7 @@
       </p:grpSpPr>
       <p:sp>
         <p:nvSpPr>
-          <p:cNvPr id="2" name="Slide Image Placeholder 1"/>
+          <p:cNvPr id="15361" name="Slide Image Placeholder 1"/>
           <p:cNvSpPr>
             <a:spLocks noGrp="1" noRot="1" noChangeAspect="1"/>
           </p:cNvSpPr>
@@ -517,11 +561,21 @@
             <p:ph type="sldImg"/>
           </p:nvPr>
         </p:nvSpPr>
-        <p:spPr/>
-      </p:sp>
-      <p:sp>
-        <p:nvSpPr>
-          <p:cNvPr id="3" name="Notes Placeholder 2"/>
+        <p:spPr bwMode="auto">
+          <a:noFill/>
+          <a:ln>
+            <a:solidFill>
+              <a:srgbClr val="000000"/>
+            </a:solidFill>
+            <a:miter lim="800000"/>
+            <a:headEnd/>
+            <a:tailEnd/>
+          </a:ln>
+        </p:spPr>
+      </p:sp>
+      <p:sp>
+        <p:nvSpPr>
+          <p:cNvPr id="15362" name="Notes Placeholder 2"/>
           <p:cNvSpPr>
             <a:spLocks noGrp="1"/>
           </p:cNvSpPr>
@@ -529,44 +583,62 @@
             <p:ph type="body" idx="1"/>
           </p:nvPr>
         </p:nvSpPr>
-        <p:spPr/>
-        <p:txBody>
-          <a:bodyPr/>
+        <p:spPr bwMode="auto">
+          <a:noFill/>
+        </p:spPr>
+        <p:txBody>
+          <a:bodyPr wrap="square" numCol="1" anchor="t" anchorCtr="0" compatLnSpc="1">
+            <a:prstTxWarp prst="textNoShape">
+              <a:avLst/>
+            </a:prstTxWarp>
+          </a:bodyPr>
           <a:lstStyle/>
           <a:p>
-            <a:endParaRPr lang="en-US" dirty="0"/>
-          </a:p>
-        </p:txBody>
-      </p:sp>
-      <p:sp>
-        <p:nvSpPr>
-          <p:cNvPr id="4" name="Slide Number Placeholder 3"/>
+            <a:pPr>
+              <a:spcBef>
+                <a:spcPct val="0"/>
+              </a:spcBef>
+            </a:pPr>
+            <a:endParaRPr lang="en-US" smtClean="0"/>
+          </a:p>
+        </p:txBody>
+      </p:sp>
+      <p:sp>
+        <p:nvSpPr>
+          <p:cNvPr id="15363" name="Slide Number Placeholder 3"/>
           <p:cNvSpPr>
             <a:spLocks noGrp="1"/>
           </p:cNvSpPr>
           <p:nvPr>
-            <p:ph type="sldNum" sz="quarter" idx="10"/>
+            <p:ph type="sldNum" sz="quarter" idx="5"/>
           </p:nvPr>
         </p:nvSpPr>
-        <p:spPr/>
-        <p:txBody>
-          <a:bodyPr/>
+        <p:spPr bwMode="auto">
+          <a:noFill/>
+          <a:ln>
+            <a:miter lim="800000"/>
+            <a:headEnd/>
+            <a:tailEnd/>
+          </a:ln>
+        </p:spPr>
+        <p:txBody>
+          <a:bodyPr wrap="square" numCol="1" anchorCtr="0" compatLnSpc="1">
+            <a:prstTxWarp prst="textNoShape">
+              <a:avLst/>
+            </a:prstTxWarp>
+          </a:bodyPr>
           <a:lstStyle/>
           <a:p>
-            <a:fld id="{26E6EE75-3F2A-9041-8B1A-2272835C97F9}" type="slidenum">
-              <a:rPr lang="en-US" smtClean="0"/>
+            <a:fld id="{DB97EC96-DF67-4439-9FD0-07FA4FE06558}" type="slidenum">
+              <a:rPr lang="en-US"/>
+              <a:pPr/>
               <a:t>1</a:t>
             </a:fld>
-            <a:endParaRPr lang="en-US" dirty="0"/>
+            <a:endParaRPr lang="en-US"/>
           </a:p>
         </p:txBody>
       </p:sp>
     </p:spTree>
-    <p:extLst>
-      <p:ext uri="{BB962C8B-B14F-4D97-AF65-F5344CB8AC3E}">
-        <p14:creationId xmlns:p14="http://schemas.microsoft.com/office/powerpoint/2010/main" val="3516954612"/>
-      </p:ext>
-    </p:extLst>
   </p:cSld>
   <p:clrMapOvr>
     <a:masterClrMapping/>
@@ -760,12 +832,12 @@
             <a:pPr>
               <a:defRPr/>
             </a:pPr>
-            <a:fld id="{EA869C11-907D-4A7F-9EA7-EFD46A12E100}" type="datetimeFigureOut">
+            <a:fld id="{8B2189E3-293D-4473-AE92-89B666198920}" type="datetimeFigureOut">
               <a:rPr lang="en-US"/>
               <a:pPr>
                 <a:defRPr/>
               </a:pPr>
-              <a:t>7/6/12</a:t>
+              <a:t>8/13/2012</a:t>
             </a:fld>
             <a:endParaRPr lang="en-US" dirty="0"/>
           </a:p>
@@ -793,7 +865,7 @@
             <a:pPr>
               <a:defRPr/>
             </a:pPr>
-            <a:endParaRPr lang="en-US" dirty="0"/>
+            <a:endParaRPr lang="en-US"/>
           </a:p>
         </p:txBody>
       </p:sp>
@@ -819,7 +891,7 @@
             <a:pPr>
               <a:defRPr/>
             </a:pPr>
-            <a:fld id="{C80855D0-533B-4B6F-AF0D-03BF56607AB1}" type="slidenum">
+            <a:fld id="{5AD0F7E9-BB42-431E-BBAF-0067466DEC32}" type="slidenum">
               <a:rPr lang="en-US"/>
               <a:pPr>
                 <a:defRPr/>
@@ -952,12 +1024,12 @@
             <a:pPr>
               <a:defRPr/>
             </a:pPr>
-            <a:fld id="{0467ED37-AAA3-4EAD-A830-705697ADDE64}" type="datetimeFigureOut">
+            <a:fld id="{A365B3D8-C070-4723-AB7C-602C55A994B2}" type="datetimeFigureOut">
               <a:rPr lang="en-US"/>
               <a:pPr>
                 <a:defRPr/>
               </a:pPr>
-              <a:t>7/6/12</a:t>
+              <a:t>8/13/2012</a:t>
             </a:fld>
             <a:endParaRPr lang="en-US" dirty="0"/>
           </a:p>
@@ -985,7 +1057,7 @@
             <a:pPr>
               <a:defRPr/>
             </a:pPr>
-            <a:endParaRPr lang="en-US" dirty="0"/>
+            <a:endParaRPr lang="en-US"/>
           </a:p>
         </p:txBody>
       </p:sp>
@@ -1011,7 +1083,7 @@
             <a:pPr>
               <a:defRPr/>
             </a:pPr>
-            <a:fld id="{191A86E2-A51C-42C9-AEA2-FEBB4B52279B}" type="slidenum">
+            <a:fld id="{234F29CA-A794-4BC4-B673-F3800D6709E8}" type="slidenum">
               <a:rPr lang="en-US"/>
               <a:pPr>
                 <a:defRPr/>
@@ -1154,12 +1226,12 @@
             <a:pPr>
               <a:defRPr/>
             </a:pPr>
-            <a:fld id="{24F69AC6-04E4-4F60-B85D-479D1FB806BE}" type="datetimeFigureOut">
+            <a:fld id="{0E6EE670-6F7A-4E10-9E33-D57EC3C51B99}" type="datetimeFigureOut">
               <a:rPr lang="en-US"/>
               <a:pPr>
                 <a:defRPr/>
               </a:pPr>
-              <a:t>7/6/12</a:t>
+              <a:t>8/13/2012</a:t>
             </a:fld>
             <a:endParaRPr lang="en-US" dirty="0"/>
           </a:p>
@@ -1187,7 +1259,7 @@
             <a:pPr>
               <a:defRPr/>
             </a:pPr>
-            <a:endParaRPr lang="en-US" dirty="0"/>
+            <a:endParaRPr lang="en-US"/>
           </a:p>
         </p:txBody>
       </p:sp>
@@ -1213,7 +1285,7 @@
             <a:pPr>
               <a:defRPr/>
             </a:pPr>
-            <a:fld id="{607962A7-0C62-4D1F-95BE-035BE58672D9}" type="slidenum">
+            <a:fld id="{63066AC8-EBE7-4FCC-807D-225E57D1E20F}" type="slidenum">
               <a:rPr lang="en-US"/>
               <a:pPr>
                 <a:defRPr/>
@@ -1346,12 +1418,12 @@
             <a:pPr>
               <a:defRPr/>
             </a:pPr>
-            <a:fld id="{C44A5AF7-AB9C-430F-ACB2-70583A16FFF2}" type="datetimeFigureOut">
+            <a:fld id="{A578BC2C-668E-4C21-8656-17F3D3C895B2}" type="datetimeFigureOut">
               <a:rPr lang="en-US"/>
               <a:pPr>
                 <a:defRPr/>
               </a:pPr>
-              <a:t>7/6/12</a:t>
+              <a:t>8/13/2012</a:t>
             </a:fld>
             <a:endParaRPr lang="en-US" dirty="0"/>
           </a:p>
@@ -1379,7 +1451,7 @@
             <a:pPr>
               <a:defRPr/>
             </a:pPr>
-            <a:endParaRPr lang="en-US" dirty="0"/>
+            <a:endParaRPr lang="en-US"/>
           </a:p>
         </p:txBody>
       </p:sp>
@@ -1405,7 +1477,7 @@
             <a:pPr>
               <a:defRPr/>
             </a:pPr>
-            <a:fld id="{57736D0B-2229-4661-AA7E-7FFAED76AF03}" type="slidenum">
+            <a:fld id="{74B08212-4EDE-49F1-A5D4-0FC936F6029C}" type="slidenum">
               <a:rPr lang="en-US"/>
               <a:pPr>
                 <a:defRPr/>
@@ -1614,12 +1686,12 @@
             <a:pPr>
               <a:defRPr/>
             </a:pPr>
-            <a:fld id="{201E5E0F-B8C0-4ABA-9C6F-CD47FF03D444}" type="datetimeFigureOut">
+            <a:fld id="{DE7921EC-BA25-402E-8AA6-2F56E0CC4F5B}" type="datetimeFigureOut">
               <a:rPr lang="en-US"/>
               <a:pPr>
                 <a:defRPr/>
               </a:pPr>
-              <a:t>7/6/12</a:t>
+              <a:t>8/13/2012</a:t>
             </a:fld>
             <a:endParaRPr lang="en-US" dirty="0"/>
           </a:p>
@@ -1647,7 +1719,7 @@
             <a:pPr>
               <a:defRPr/>
             </a:pPr>
-            <a:endParaRPr lang="en-US" dirty="0"/>
+            <a:endParaRPr lang="en-US"/>
           </a:p>
         </p:txBody>
       </p:sp>
@@ -1673,7 +1745,7 @@
             <a:pPr>
               <a:defRPr/>
             </a:pPr>
-            <a:fld id="{3D1619AF-B268-45A6-AA9D-F07579FEC687}" type="slidenum">
+            <a:fld id="{0EB73CC7-52FF-4C3E-AE7D-11CFCA51303E}" type="slidenum">
               <a:rPr lang="en-US"/>
               <a:pPr>
                 <a:defRPr/>
@@ -1924,12 +1996,12 @@
             <a:pPr>
               <a:defRPr/>
             </a:pPr>
-            <a:fld id="{EBF747BF-6E29-4437-AC11-2005B4CB9278}" type="datetimeFigureOut">
+            <a:fld id="{84A5E1B1-00EC-442C-8BAD-9A0F781C6F6D}" type="datetimeFigureOut">
               <a:rPr lang="en-US"/>
               <a:pPr>
                 <a:defRPr/>
               </a:pPr>
-              <a:t>7/6/12</a:t>
+              <a:t>8/13/2012</a:t>
             </a:fld>
             <a:endParaRPr lang="en-US" dirty="0"/>
           </a:p>
@@ -1957,7 +2029,7 @@
             <a:pPr>
               <a:defRPr/>
             </a:pPr>
-            <a:endParaRPr lang="en-US" dirty="0"/>
+            <a:endParaRPr lang="en-US"/>
           </a:p>
         </p:txBody>
       </p:sp>
@@ -1983,7 +2055,7 @@
             <a:pPr>
               <a:defRPr/>
             </a:pPr>
-            <a:fld id="{DFF1E6BD-0AED-4CA9-9911-18A254D86A0B}" type="slidenum">
+            <a:fld id="{66308336-9F81-470D-A6E0-10D72892B75C}" type="slidenum">
               <a:rPr lang="en-US"/>
               <a:pPr>
                 <a:defRPr/>
@@ -2368,12 +2440,12 @@
             <a:pPr>
               <a:defRPr/>
             </a:pPr>
-            <a:fld id="{B33299F7-6BA2-4DC5-800A-D39A11919286}" type="datetimeFigureOut">
+            <a:fld id="{3C5D734D-22AA-4253-BC26-EE7B86ED82F6}" type="datetimeFigureOut">
               <a:rPr lang="en-US"/>
               <a:pPr>
                 <a:defRPr/>
               </a:pPr>
-              <a:t>7/6/12</a:t>
+              <a:t>8/13/2012</a:t>
             </a:fld>
             <a:endParaRPr lang="en-US" dirty="0"/>
           </a:p>
@@ -2401,7 +2473,7 @@
             <a:pPr>
               <a:defRPr/>
             </a:pPr>
-            <a:endParaRPr lang="en-US" dirty="0"/>
+            <a:endParaRPr lang="en-US"/>
           </a:p>
         </p:txBody>
       </p:sp>
@@ -2427,7 +2499,7 @@
             <a:pPr>
               <a:defRPr/>
             </a:pPr>
-            <a:fld id="{AA45CA4C-7773-4BB3-92F9-3B1E2FCC57F3}" type="slidenum">
+            <a:fld id="{2041ACC5-75D4-440D-8734-FC564C1447CD}" type="slidenum">
               <a:rPr lang="en-US"/>
               <a:pPr>
                 <a:defRPr/>
@@ -2508,12 +2580,12 @@
             <a:pPr>
               <a:defRPr/>
             </a:pPr>
-            <a:fld id="{25C03C68-02DE-4C4E-941A-96ECF28F7C67}" type="datetimeFigureOut">
+            <a:fld id="{6E2C4EE2-292A-4028-8B81-4EAA31C1428B}" type="datetimeFigureOut">
               <a:rPr lang="en-US"/>
               <a:pPr>
                 <a:defRPr/>
               </a:pPr>
-              <a:t>7/6/12</a:t>
+              <a:t>8/13/2012</a:t>
             </a:fld>
             <a:endParaRPr lang="en-US" dirty="0"/>
           </a:p>
@@ -2541,7 +2613,7 @@
             <a:pPr>
               <a:defRPr/>
             </a:pPr>
-            <a:endParaRPr lang="en-US" dirty="0"/>
+            <a:endParaRPr lang="en-US"/>
           </a:p>
         </p:txBody>
       </p:sp>
@@ -2567,7 +2639,7 @@
             <a:pPr>
               <a:defRPr/>
             </a:pPr>
-            <a:fld id="{7F04C4E5-A64F-4658-BAC7-979F6381C29E}" type="slidenum">
+            <a:fld id="{230998A9-CB1B-4EB5-B220-69AF666C644A}" type="slidenum">
               <a:rPr lang="en-US"/>
               <a:pPr>
                 <a:defRPr/>
@@ -2625,12 +2697,12 @@
             <a:pPr>
               <a:defRPr/>
             </a:pPr>
-            <a:fld id="{D9A589FA-27C3-4FD1-B7A7-82FFAEF89949}" type="datetimeFigureOut">
+            <a:fld id="{A9A918CE-0DAA-4989-AF7A-EDA8DDA82461}" type="datetimeFigureOut">
               <a:rPr lang="en-US"/>
               <a:pPr>
                 <a:defRPr/>
               </a:pPr>
-              <a:t>7/6/12</a:t>
+              <a:t>8/13/2012</a:t>
             </a:fld>
             <a:endParaRPr lang="en-US" dirty="0"/>
           </a:p>
@@ -2658,7 +2730,7 @@
             <a:pPr>
               <a:defRPr/>
             </a:pPr>
-            <a:endParaRPr lang="en-US" dirty="0"/>
+            <a:endParaRPr lang="en-US"/>
           </a:p>
         </p:txBody>
       </p:sp>
@@ -2684,7 +2756,7 @@
             <a:pPr>
               <a:defRPr/>
             </a:pPr>
-            <a:fld id="{AD2585F0-FCA0-4BA4-80AD-C2DC395DB445}" type="slidenum">
+            <a:fld id="{69F7BEE7-91D5-4B37-B46B-386717C6D6C8}" type="slidenum">
               <a:rPr lang="en-US"/>
               <a:pPr>
                 <a:defRPr/>
@@ -2924,12 +2996,12 @@
             <a:pPr>
               <a:defRPr/>
             </a:pPr>
-            <a:fld id="{7B5ADE40-7230-43BF-9A60-976B754BB36D}" type="datetimeFigureOut">
+            <a:fld id="{7A53EF31-1FBE-4A5C-9117-977CF69B2FAC}" type="datetimeFigureOut">
               <a:rPr lang="en-US"/>
               <a:pPr>
                 <a:defRPr/>
               </a:pPr>
-              <a:t>7/6/12</a:t>
+              <a:t>8/13/2012</a:t>
             </a:fld>
             <a:endParaRPr lang="en-US" dirty="0"/>
           </a:p>
@@ -2957,7 +3029,7 @@
             <a:pPr>
               <a:defRPr/>
             </a:pPr>
-            <a:endParaRPr lang="en-US" dirty="0"/>
+            <a:endParaRPr lang="en-US"/>
           </a:p>
         </p:txBody>
       </p:sp>
@@ -2983,7 +3055,7 @@
             <a:pPr>
               <a:defRPr/>
             </a:pPr>
-            <a:fld id="{26D76953-EE80-4FAF-B5CF-0E397D49EF9B}" type="slidenum">
+            <a:fld id="{3B8BDBDE-242D-4D05-B74F-AD4760CAE6C1}" type="slidenum">
               <a:rPr lang="en-US"/>
               <a:pPr>
                 <a:defRPr/>
@@ -3202,12 +3274,12 @@
             <a:pPr>
               <a:defRPr/>
             </a:pPr>
-            <a:fld id="{FEFFC9D6-420E-4A04-BCC6-71D068D97AFE}" type="datetimeFigureOut">
+            <a:fld id="{1DEEC612-6971-4DC5-A9BC-941541A4F8CB}" type="datetimeFigureOut">
               <a:rPr lang="en-US"/>
               <a:pPr>
                 <a:defRPr/>
               </a:pPr>
-              <a:t>7/6/12</a:t>
+              <a:t>8/13/2012</a:t>
             </a:fld>
             <a:endParaRPr lang="en-US" dirty="0"/>
           </a:p>
@@ -3235,7 +3307,7 @@
             <a:pPr>
               <a:defRPr/>
             </a:pPr>
-            <a:endParaRPr lang="en-US" dirty="0"/>
+            <a:endParaRPr lang="en-US"/>
           </a:p>
         </p:txBody>
       </p:sp>
@@ -3261,7 +3333,7 @@
             <a:pPr>
               <a:defRPr/>
             </a:pPr>
-            <a:fld id="{5E817595-02ED-404B-B6B7-34656E1A59B0}" type="slidenum">
+            <a:fld id="{2BF5544B-AA3A-4C73-BC31-09CA11077BE1}" type="slidenum">
               <a:rPr lang="en-US"/>
               <a:pPr>
                 <a:defRPr/>
@@ -3443,7 +3515,7 @@
               <a:spcAft>
                 <a:spcPts val="0"/>
               </a:spcAft>
-              <a:defRPr sz="1200" smtClean="0">
+              <a:defRPr sz="1200">
                 <a:solidFill>
                   <a:schemeClr val="tx1">
                     <a:tint val="75000"/>
@@ -3458,12 +3530,12 @@
             <a:pPr>
               <a:defRPr/>
             </a:pPr>
-            <a:fld id="{53920EE2-9CA1-4F3F-9FD5-0673D5D0DB53}" type="datetimeFigureOut">
+            <a:fld id="{7346E4F5-01E9-48BA-B072-C3844D848CA3}" type="datetimeFigureOut">
               <a:rPr lang="en-US"/>
               <a:pPr>
                 <a:defRPr/>
               </a:pPr>
-              <a:t>7/6/12</a:t>
+              <a:t>8/13/2012</a:t>
             </a:fld>
             <a:endParaRPr lang="en-US" dirty="0"/>
           </a:p>
@@ -3492,6 +3564,54 @@
           <a:bodyPr vert="horz" lIns="91440" tIns="45720" rIns="91440" bIns="45720" rtlCol="0" anchor="ctr"/>
           <a:lstStyle>
             <a:lvl1pPr algn="ctr" fontAlgn="auto">
+              <a:spcBef>
+                <a:spcPts val="0"/>
+              </a:spcBef>
+              <a:spcAft>
+                <a:spcPts val="0"/>
+              </a:spcAft>
+              <a:defRPr sz="1200" dirty="0">
+                <a:solidFill>
+                  <a:schemeClr val="tx1">
+                    <a:tint val="75000"/>
+                  </a:schemeClr>
+                </a:solidFill>
+                <a:latin typeface="+mn-lt"/>
+                <a:cs typeface="+mn-cs"/>
+              </a:defRPr>
+            </a:lvl1pPr>
+          </a:lstStyle>
+          <a:p>
+            <a:pPr>
+              <a:defRPr/>
+            </a:pPr>
+            <a:endParaRPr lang="en-US"/>
+          </a:p>
+        </p:txBody>
+      </p:sp>
+      <p:sp>
+        <p:nvSpPr>
+          <p:cNvPr id="6" name="Slide Number Placeholder 5"/>
+          <p:cNvSpPr>
+            <a:spLocks noGrp="1"/>
+          </p:cNvSpPr>
+          <p:nvPr>
+            <p:ph type="sldNum" sz="quarter" idx="4"/>
+          </p:nvPr>
+        </p:nvSpPr>
+        <p:spPr>
+          <a:xfrm>
+            <a:off x="6553200" y="6356350"/>
+            <a:ext cx="2133600" cy="365125"/>
+          </a:xfrm>
+          <a:prstGeom prst="rect">
+            <a:avLst/>
+          </a:prstGeom>
+        </p:spPr>
+        <p:txBody>
+          <a:bodyPr vert="horz" lIns="91440" tIns="45720" rIns="91440" bIns="45720" rtlCol="0" anchor="ctr"/>
+          <a:lstStyle>
+            <a:lvl1pPr algn="r" fontAlgn="auto">
               <a:spcBef>
                 <a:spcPts val="0"/>
               </a:spcBef>
@@ -3513,55 +3633,7 @@
             <a:pPr>
               <a:defRPr/>
             </a:pPr>
-            <a:endParaRPr lang="en-US" dirty="0"/>
-          </a:p>
-        </p:txBody>
-      </p:sp>
-      <p:sp>
-        <p:nvSpPr>
-          <p:cNvPr id="6" name="Slide Number Placeholder 5"/>
-          <p:cNvSpPr>
-            <a:spLocks noGrp="1"/>
-          </p:cNvSpPr>
-          <p:nvPr>
-            <p:ph type="sldNum" sz="quarter" idx="4"/>
-          </p:nvPr>
-        </p:nvSpPr>
-        <p:spPr>
-          <a:xfrm>
-            <a:off x="6553200" y="6356350"/>
-            <a:ext cx="2133600" cy="365125"/>
-          </a:xfrm>
-          <a:prstGeom prst="rect">
-            <a:avLst/>
-          </a:prstGeom>
-        </p:spPr>
-        <p:txBody>
-          <a:bodyPr vert="horz" lIns="91440" tIns="45720" rIns="91440" bIns="45720" rtlCol="0" anchor="ctr"/>
-          <a:lstStyle>
-            <a:lvl1pPr algn="r" fontAlgn="auto">
-              <a:spcBef>
-                <a:spcPts val="0"/>
-              </a:spcBef>
-              <a:spcAft>
-                <a:spcPts val="0"/>
-              </a:spcAft>
-              <a:defRPr sz="1200" smtClean="0">
-                <a:solidFill>
-                  <a:schemeClr val="tx1">
-                    <a:tint val="75000"/>
-                  </a:schemeClr>
-                </a:solidFill>
-                <a:latin typeface="+mn-lt"/>
-                <a:cs typeface="+mn-cs"/>
-              </a:defRPr>
-            </a:lvl1pPr>
-          </a:lstStyle>
-          <a:p>
-            <a:pPr>
-              <a:defRPr/>
-            </a:pPr>
-            <a:fld id="{ABFE99C4-9921-4EC1-B89D-4BB7C5D58CB9}" type="slidenum">
+            <a:fld id="{C6EA8086-9F52-40EB-8386-FA2F31A75778}" type="slidenum">
               <a:rPr lang="en-US"/>
               <a:pPr>
                 <a:defRPr/>
@@ -3590,7 +3662,7 @@
   </p:sldLayoutIdLst>
   <p:txStyles>
     <p:titleStyle>
-      <a:lvl1pPr algn="ctr" defTabSz="457200" rtl="0" fontAlgn="base">
+      <a:lvl1pPr algn="ctr" defTabSz="457200" rtl="0" eaLnBrk="0" fontAlgn="base" hangingPunct="0">
         <a:spcBef>
           <a:spcPct val="0"/>
         </a:spcBef>
@@ -3606,7 +3678,7 @@
           <a:cs typeface="+mj-cs"/>
         </a:defRPr>
       </a:lvl1pPr>
-      <a:lvl2pPr algn="ctr" defTabSz="457200" rtl="0" fontAlgn="base">
+      <a:lvl2pPr algn="ctr" defTabSz="457200" rtl="0" eaLnBrk="0" fontAlgn="base" hangingPunct="0">
         <a:spcBef>
           <a:spcPct val="0"/>
         </a:spcBef>
@@ -3620,7 +3692,7 @@
           <a:latin typeface="Calibri" pitchFamily="34" charset="0"/>
         </a:defRPr>
       </a:lvl2pPr>
-      <a:lvl3pPr algn="ctr" defTabSz="457200" rtl="0" fontAlgn="base">
+      <a:lvl3pPr algn="ctr" defTabSz="457200" rtl="0" eaLnBrk="0" fontAlgn="base" hangingPunct="0">
         <a:spcBef>
           <a:spcPct val="0"/>
         </a:spcBef>
@@ -3634,7 +3706,7 @@
           <a:latin typeface="Calibri" pitchFamily="34" charset="0"/>
         </a:defRPr>
       </a:lvl3pPr>
-      <a:lvl4pPr algn="ctr" defTabSz="457200" rtl="0" fontAlgn="base">
+      <a:lvl4pPr algn="ctr" defTabSz="457200" rtl="0" eaLnBrk="0" fontAlgn="base" hangingPunct="0">
         <a:spcBef>
           <a:spcPct val="0"/>
         </a:spcBef>
@@ -3648,7 +3720,7 @@
           <a:latin typeface="Calibri" pitchFamily="34" charset="0"/>
         </a:defRPr>
       </a:lvl4pPr>
-      <a:lvl5pPr algn="ctr" defTabSz="457200" rtl="0" fontAlgn="base">
+      <a:lvl5pPr algn="ctr" defTabSz="457200" rtl="0" eaLnBrk="0" fontAlgn="base" hangingPunct="0">
         <a:spcBef>
           <a:spcPct val="0"/>
         </a:spcBef>
@@ -3720,7 +3792,7 @@
       </a:lvl9pPr>
     </p:titleStyle>
     <p:bodyStyle>
-      <a:lvl1pPr marL="342900" indent="-342900" algn="l" defTabSz="457200" rtl="0" fontAlgn="base">
+      <a:lvl1pPr marL="342900" indent="-342900" algn="l" defTabSz="457200" rtl="0" eaLnBrk="0" fontAlgn="base" hangingPunct="0">
         <a:spcBef>
           <a:spcPct val="20000"/>
         </a:spcBef>
@@ -3738,7 +3810,7 @@
           <a:cs typeface="+mn-cs"/>
         </a:defRPr>
       </a:lvl1pPr>
-      <a:lvl2pPr marL="742950" indent="-285750" algn="l" defTabSz="457200" rtl="0" fontAlgn="base">
+      <a:lvl2pPr marL="742950" indent="-285750" algn="l" defTabSz="457200" rtl="0" eaLnBrk="0" fontAlgn="base" hangingPunct="0">
         <a:spcBef>
           <a:spcPct val="20000"/>
         </a:spcBef>
@@ -3756,7 +3828,7 @@
           <a:cs typeface="+mn-cs"/>
         </a:defRPr>
       </a:lvl2pPr>
-      <a:lvl3pPr marL="1143000" indent="-228600" algn="l" defTabSz="457200" rtl="0" fontAlgn="base">
+      <a:lvl3pPr marL="1143000" indent="-228600" algn="l" defTabSz="457200" rtl="0" eaLnBrk="0" fontAlgn="base" hangingPunct="0">
         <a:spcBef>
           <a:spcPct val="20000"/>
         </a:spcBef>
@@ -3774,7 +3846,7 @@
           <a:cs typeface="+mn-cs"/>
         </a:defRPr>
       </a:lvl3pPr>
-      <a:lvl4pPr marL="1600200" indent="-228600" algn="l" defTabSz="457200" rtl="0" fontAlgn="base">
+      <a:lvl4pPr marL="1600200" indent="-228600" algn="l" defTabSz="457200" rtl="0" eaLnBrk="0" fontAlgn="base" hangingPunct="0">
         <a:spcBef>
           <a:spcPct val="20000"/>
         </a:spcBef>
@@ -3792,7 +3864,7 @@
           <a:cs typeface="+mn-cs"/>
         </a:defRPr>
       </a:lvl4pPr>
-      <a:lvl5pPr marL="2057400" indent="-228600" algn="l" defTabSz="457200" rtl="0" fontAlgn="base">
+      <a:lvl5pPr marL="2057400" indent="-228600" algn="l" defTabSz="457200" rtl="0" eaLnBrk="0" fontAlgn="base" hangingPunct="0">
         <a:spcBef>
           <a:spcPct val="20000"/>
         </a:spcBef>
@@ -3989,21 +4061,23 @@
       </p:grpSpPr>
       <p:grpSp>
         <p:nvGrpSpPr>
-          <p:cNvPr id="13" name="Group 12"/>
-          <p:cNvGrpSpPr/>
+          <p:cNvPr id="14337" name="Group 12"/>
+          <p:cNvGrpSpPr>
+            <a:grpSpLocks/>
+          </p:cNvGrpSpPr>
           <p:nvPr/>
         </p:nvGrpSpPr>
-        <p:grpSpPr>
+        <p:grpSpPr bwMode="auto">
           <a:xfrm>
-            <a:off x="552215" y="400243"/>
-            <a:ext cx="2913470" cy="5626206"/>
+            <a:off x="552450" y="400050"/>
+            <a:ext cx="2913063" cy="5626100"/>
             <a:chOff x="298217" y="400243"/>
             <a:chExt cx="2913470" cy="5626206"/>
           </a:xfrm>
         </p:grpSpPr>
         <p:sp>
           <p:nvSpPr>
-            <p:cNvPr id="13323" name="TextBox 30"/>
+            <p:cNvPr id="14360" name="TextBox 30"/>
             <p:cNvSpPr txBox="1">
               <a:spLocks noChangeArrowheads="1"/>
             </p:cNvSpPr>
@@ -4032,7 +4106,7 @@
             <a:lstStyle/>
             <a:p>
               <a:r>
-                <a:rPr lang="en-US" dirty="0">
+                <a:rPr lang="en-US">
                   <a:latin typeface="Calibri" pitchFamily="34" charset="0"/>
                 </a:rPr>
                 <a:t>HashSet</a:t>
@@ -4048,8 +4122,8 @@
           </p:nvSpPr>
           <p:spPr>
             <a:xfrm>
-              <a:off x="1078087" y="1816101"/>
-              <a:ext cx="2133600" cy="609600"/>
+              <a:off x="1077789" y="1816320"/>
+              <a:ext cx="2133898" cy="609611"/>
             </a:xfrm>
             <a:prstGeom prst="rect">
               <a:avLst/>
@@ -4104,8 +4178,8 @@
           </p:nvSpPr>
           <p:spPr>
             <a:xfrm>
-              <a:off x="392287" y="764659"/>
-              <a:ext cx="2133600" cy="612648"/>
+              <a:off x="391893" y="765375"/>
+              <a:ext cx="2133898" cy="611200"/>
             </a:xfrm>
             <a:prstGeom prst="rect">
               <a:avLst/>
@@ -4164,8 +4238,8 @@
           </p:nvCxnSpPr>
           <p:spPr>
             <a:xfrm rot="16200000" flipH="1">
-              <a:off x="588367" y="1631180"/>
-              <a:ext cx="751371" cy="228069"/>
+              <a:off x="588816" y="1632152"/>
+              <a:ext cx="750901" cy="227045"/>
             </a:xfrm>
             <a:prstGeom prst="bentConnector2">
               <a:avLst/>
@@ -4194,7 +4268,7 @@
         </p:cxnSp>
         <p:sp>
           <p:nvSpPr>
-            <p:cNvPr id="13324" name="TextBox 31"/>
+            <p:cNvPr id="14364" name="TextBox 31"/>
             <p:cNvSpPr txBox="1">
               <a:spLocks noChangeArrowheads="1"/>
             </p:cNvSpPr>
@@ -4223,7 +4297,7 @@
             <a:lstStyle/>
             <a:p>
               <a:r>
-                <a:rPr lang="en-US" dirty="0">
+                <a:rPr lang="en-US">
                   <a:latin typeface="Calibri" pitchFamily="34" charset="0"/>
                 </a:rPr>
                 <a:t>HashMap</a:t>
@@ -4233,7 +4307,7 @@
         </p:sp>
         <p:sp>
           <p:nvSpPr>
-            <p:cNvPr id="13325" name="TextBox 32"/>
+            <p:cNvPr id="14365" name="TextBox 32"/>
             <p:cNvSpPr txBox="1">
               <a:spLocks noChangeArrowheads="1"/>
             </p:cNvSpPr>
@@ -4262,14 +4336,11 @@
             <a:lstStyle/>
             <a:p>
               <a:r>
-                <a:rPr lang="en-US" dirty="0" smtClean="0">
+                <a:rPr lang="en-US">
                   <a:latin typeface="Calibri" pitchFamily="34" charset="0"/>
                 </a:rPr>
                 <a:t>Object[]</a:t>
               </a:r>
-              <a:endParaRPr lang="en-US" dirty="0">
-                <a:latin typeface="Calibri" pitchFamily="34" charset="0"/>
-              </a:endParaRPr>
             </a:p>
           </p:txBody>
         </p:sp>
@@ -4281,8 +4352,8 @@
           </p:nvSpPr>
           <p:spPr>
             <a:xfrm>
-              <a:off x="1763887" y="2955925"/>
-              <a:ext cx="612775" cy="708218"/>
+              <a:off x="1763685" y="2956166"/>
+              <a:ext cx="612861" cy="708038"/>
             </a:xfrm>
             <a:prstGeom prst="rect">
               <a:avLst/>
@@ -4337,8 +4408,8 @@
           </p:nvSpPr>
           <p:spPr>
             <a:xfrm>
-              <a:off x="1763888" y="3664143"/>
-              <a:ext cx="612775" cy="145857"/>
+              <a:off x="1763685" y="3664204"/>
+              <a:ext cx="612861" cy="146053"/>
             </a:xfrm>
             <a:prstGeom prst="rect">
               <a:avLst/>
@@ -4395,8 +4466,8 @@
           </p:nvCxnSpPr>
           <p:spPr>
             <a:xfrm rot="16200000" flipH="1">
-              <a:off x="1214035" y="2760182"/>
-              <a:ext cx="871634" cy="228069"/>
+              <a:off x="1213592" y="2760093"/>
+              <a:ext cx="871554" cy="228632"/>
             </a:xfrm>
             <a:prstGeom prst="bentConnector2">
               <a:avLst/>
@@ -4431,8 +4502,8 @@
           </p:nvSpPr>
           <p:spPr>
             <a:xfrm>
-              <a:off x="1760712" y="3816543"/>
-              <a:ext cx="612775" cy="145857"/>
+              <a:off x="1760509" y="3816607"/>
+              <a:ext cx="612861" cy="146053"/>
             </a:xfrm>
             <a:prstGeom prst="rect">
               <a:avLst/>
@@ -4487,8 +4558,8 @@
           </p:nvSpPr>
           <p:spPr>
             <a:xfrm>
-              <a:off x="1760712" y="3962400"/>
-              <a:ext cx="612775" cy="145857"/>
+              <a:off x="1760509" y="3962660"/>
+              <a:ext cx="612861" cy="146053"/>
             </a:xfrm>
             <a:prstGeom prst="rect">
               <a:avLst/>
@@ -4543,8 +4614,8 @@
           </p:nvSpPr>
           <p:spPr>
             <a:xfrm>
-              <a:off x="1763887" y="4116543"/>
-              <a:ext cx="612775" cy="145857"/>
+              <a:off x="1763685" y="4116651"/>
+              <a:ext cx="612861" cy="146053"/>
             </a:xfrm>
             <a:prstGeom prst="rect">
               <a:avLst/>
@@ -4599,8 +4670,8 @@
           </p:nvSpPr>
           <p:spPr>
             <a:xfrm>
-              <a:off x="1763888" y="4267200"/>
-              <a:ext cx="612775" cy="145857"/>
+              <a:off x="1763685" y="4267466"/>
+              <a:ext cx="612861" cy="146053"/>
             </a:xfrm>
             <a:prstGeom prst="rect">
               <a:avLst/>
@@ -4655,8 +4726,8 @@
           </p:nvSpPr>
           <p:spPr>
             <a:xfrm>
-              <a:off x="1763887" y="4413057"/>
-              <a:ext cx="612775" cy="145857"/>
+              <a:off x="1763685" y="4413519"/>
+              <a:ext cx="612861" cy="146053"/>
             </a:xfrm>
             <a:prstGeom prst="rect">
               <a:avLst/>
@@ -4711,8 +4782,8 @@
           </p:nvSpPr>
           <p:spPr>
             <a:xfrm>
-              <a:off x="1763887" y="4558914"/>
-              <a:ext cx="612775" cy="145857"/>
+              <a:off x="1763685" y="4559571"/>
+              <a:ext cx="612861" cy="144466"/>
             </a:xfrm>
             <a:prstGeom prst="rect">
               <a:avLst/>
@@ -4767,8 +4838,8 @@
           </p:nvSpPr>
           <p:spPr>
             <a:xfrm>
-              <a:off x="1760712" y="4704771"/>
-              <a:ext cx="612775" cy="145857"/>
+              <a:off x="1760509" y="4704037"/>
+              <a:ext cx="612861" cy="146053"/>
             </a:xfrm>
             <a:prstGeom prst="rect">
               <a:avLst/>
@@ -4823,8 +4894,8 @@
           </p:nvSpPr>
           <p:spPr>
             <a:xfrm>
-              <a:off x="1760712" y="4850628"/>
-              <a:ext cx="612775" cy="145857"/>
+              <a:off x="1760509" y="4850090"/>
+              <a:ext cx="612861" cy="146053"/>
             </a:xfrm>
             <a:prstGeom prst="rect">
               <a:avLst/>
@@ -4879,8 +4950,8 @@
           </p:nvSpPr>
           <p:spPr>
             <a:xfrm>
-              <a:off x="1760712" y="4996485"/>
-              <a:ext cx="612775" cy="145857"/>
+              <a:off x="1760509" y="4996143"/>
+              <a:ext cx="612861" cy="146053"/>
             </a:xfrm>
             <a:prstGeom prst="rect">
               <a:avLst/>
@@ -4935,8 +5006,8 @@
           </p:nvSpPr>
           <p:spPr>
             <a:xfrm>
-              <a:off x="1760712" y="5151307"/>
-              <a:ext cx="612775" cy="145857"/>
+              <a:off x="1760509" y="5151721"/>
+              <a:ext cx="612861" cy="146053"/>
             </a:xfrm>
             <a:prstGeom prst="rect">
               <a:avLst/>
@@ -4991,8 +5062,8 @@
           </p:nvSpPr>
           <p:spPr>
             <a:xfrm>
-              <a:off x="1760712" y="5297164"/>
-              <a:ext cx="612775" cy="145857"/>
+              <a:off x="1760509" y="5297773"/>
+              <a:ext cx="612861" cy="144465"/>
             </a:xfrm>
             <a:prstGeom prst="rect">
               <a:avLst/>
@@ -5047,8 +5118,8 @@
           </p:nvSpPr>
           <p:spPr>
             <a:xfrm>
-              <a:off x="1760712" y="5443021"/>
-              <a:ext cx="612775" cy="145857"/>
+              <a:off x="1760509" y="5442238"/>
+              <a:ext cx="612861" cy="146053"/>
             </a:xfrm>
             <a:prstGeom prst="rect">
               <a:avLst/>
@@ -5103,8 +5174,8 @@
           </p:nvSpPr>
           <p:spPr>
             <a:xfrm>
-              <a:off x="1760712" y="5588878"/>
-              <a:ext cx="612775" cy="145857"/>
+              <a:off x="1760509" y="5588291"/>
+              <a:ext cx="612861" cy="146053"/>
             </a:xfrm>
             <a:prstGeom prst="rect">
               <a:avLst/>
@@ -5159,8 +5230,8 @@
           </p:nvSpPr>
           <p:spPr>
             <a:xfrm>
-              <a:off x="1760712" y="5734735"/>
-              <a:ext cx="612775" cy="145857"/>
+              <a:off x="1760509" y="5734343"/>
+              <a:ext cx="612861" cy="146053"/>
             </a:xfrm>
             <a:prstGeom prst="rect">
               <a:avLst/>
@@ -5215,8 +5286,8 @@
           </p:nvSpPr>
           <p:spPr>
             <a:xfrm>
-              <a:off x="1760712" y="5880592"/>
-              <a:ext cx="612775" cy="145857"/>
+              <a:off x="1760509" y="5880396"/>
+              <a:ext cx="612861" cy="146053"/>
             </a:xfrm>
             <a:prstGeom prst="rect">
               <a:avLst/>
@@ -5266,14 +5337,16 @@
       </p:grpSp>
       <p:grpSp>
         <p:nvGrpSpPr>
-          <p:cNvPr id="11" name="Group 10"/>
-          <p:cNvGrpSpPr/>
+          <p:cNvPr id="14338" name="Group 10"/>
+          <p:cNvGrpSpPr>
+            <a:grpSpLocks/>
+          </p:cNvGrpSpPr>
           <p:nvPr/>
         </p:nvGrpSpPr>
-        <p:grpSpPr>
+        <p:grpSpPr bwMode="auto">
           <a:xfrm>
-            <a:off x="6391239" y="402131"/>
-            <a:ext cx="2227670" cy="3594447"/>
+            <a:off x="6391275" y="401638"/>
+            <a:ext cx="2227263" cy="3595687"/>
             <a:chOff x="3286819" y="402131"/>
             <a:chExt cx="2227670" cy="3594447"/>
           </a:xfrm>
@@ -5286,8 +5359,8 @@
           </p:nvSpPr>
           <p:spPr>
             <a:xfrm>
-              <a:off x="3380889" y="766547"/>
-              <a:ext cx="2133600" cy="612648"/>
+              <a:off x="3380499" y="767130"/>
+              <a:ext cx="2133990" cy="612564"/>
             </a:xfrm>
             <a:prstGeom prst="rect">
               <a:avLst/>
@@ -5346,8 +5419,8 @@
           </p:nvCxnSpPr>
           <p:spPr>
             <a:xfrm rot="16200000" flipH="1">
-              <a:off x="3555745" y="1654291"/>
-              <a:ext cx="792853" cy="227103"/>
+              <a:off x="3556952" y="1654176"/>
+              <a:ext cx="791890" cy="227054"/>
             </a:xfrm>
             <a:prstGeom prst="bentConnector2">
               <a:avLst/>
@@ -5376,7 +5449,7 @@
         </p:cxnSp>
         <p:sp>
           <p:nvSpPr>
-            <p:cNvPr id="78" name="TextBox 30"/>
+            <p:cNvPr id="14347" name="TextBox 30"/>
             <p:cNvSpPr txBox="1">
               <a:spLocks noChangeArrowheads="1"/>
             </p:cNvSpPr>
@@ -5405,20 +5478,17 @@
             <a:lstStyle/>
             <a:p>
               <a:r>
-                <a:rPr lang="en-US" dirty="0" smtClean="0">
+                <a:rPr lang="en-US">
                   <a:latin typeface="Calibri" pitchFamily="34" charset="0"/>
                 </a:rPr>
                 <a:t>ArrayList</a:t>
               </a:r>
-              <a:endParaRPr lang="en-US" dirty="0">
-                <a:latin typeface="Calibri" pitchFamily="34" charset="0"/>
-              </a:endParaRPr>
             </a:p>
           </p:txBody>
         </p:sp>
         <p:sp>
           <p:nvSpPr>
-            <p:cNvPr id="89" name="TextBox 32"/>
+            <p:cNvPr id="14348" name="TextBox 32"/>
             <p:cNvSpPr txBox="1">
               <a:spLocks noChangeArrowheads="1"/>
             </p:cNvSpPr>
@@ -5447,14 +5517,11 @@
             <a:lstStyle/>
             <a:p>
               <a:r>
-                <a:rPr lang="en-US" dirty="0" smtClean="0">
+                <a:rPr lang="en-US">
                   <a:latin typeface="Calibri" pitchFamily="34" charset="0"/>
                 </a:rPr>
                 <a:t>Object[]</a:t>
               </a:r>
-              <a:endParaRPr lang="en-US" dirty="0">
-                <a:latin typeface="Calibri" pitchFamily="34" charset="0"/>
-              </a:endParaRPr>
             </a:p>
           </p:txBody>
         </p:sp>
@@ -5466,8 +5533,8 @@
           </p:nvSpPr>
           <p:spPr>
             <a:xfrm>
-              <a:off x="4065723" y="1810161"/>
-              <a:ext cx="612775" cy="708218"/>
+              <a:off x="4066424" y="1809757"/>
+              <a:ext cx="611299" cy="709368"/>
             </a:xfrm>
             <a:prstGeom prst="rect">
               <a:avLst/>
@@ -5522,8 +5589,8 @@
           </p:nvSpPr>
           <p:spPr>
             <a:xfrm>
-              <a:off x="4065724" y="2518379"/>
-              <a:ext cx="612775" cy="145857"/>
+              <a:off x="4066424" y="2519126"/>
+              <a:ext cx="611299" cy="144412"/>
             </a:xfrm>
             <a:prstGeom prst="rect">
               <a:avLst/>
@@ -5578,8 +5645,8 @@
           </p:nvSpPr>
           <p:spPr>
             <a:xfrm>
-              <a:off x="4062548" y="2670779"/>
-              <a:ext cx="612775" cy="145857"/>
+              <a:off x="4063249" y="2671473"/>
+              <a:ext cx="611299" cy="144412"/>
             </a:xfrm>
             <a:prstGeom prst="rect">
               <a:avLst/>
@@ -5634,8 +5701,8 @@
           </p:nvSpPr>
           <p:spPr>
             <a:xfrm>
-              <a:off x="4062548" y="2816636"/>
-              <a:ext cx="612775" cy="145857"/>
+              <a:off x="4063249" y="2815885"/>
+              <a:ext cx="611299" cy="146000"/>
             </a:xfrm>
             <a:prstGeom prst="rect">
               <a:avLst/>
@@ -5690,8 +5757,8 @@
           </p:nvSpPr>
           <p:spPr>
             <a:xfrm>
-              <a:off x="4065723" y="2970779"/>
-              <a:ext cx="612775" cy="145857"/>
+              <a:off x="4066424" y="2971407"/>
+              <a:ext cx="611299" cy="146000"/>
             </a:xfrm>
             <a:prstGeom prst="rect">
               <a:avLst/>
@@ -5746,8 +5813,8 @@
           </p:nvSpPr>
           <p:spPr>
             <a:xfrm>
-              <a:off x="4065724" y="3121436"/>
-              <a:ext cx="612775" cy="145857"/>
+              <a:off x="4066424" y="3122168"/>
+              <a:ext cx="611299" cy="144412"/>
             </a:xfrm>
             <a:prstGeom prst="rect">
               <a:avLst/>
@@ -5802,8 +5869,8 @@
           </p:nvSpPr>
           <p:spPr>
             <a:xfrm>
-              <a:off x="4065723" y="3267293"/>
-              <a:ext cx="612775" cy="145857"/>
+              <a:off x="4066424" y="3266580"/>
+              <a:ext cx="611299" cy="146000"/>
             </a:xfrm>
             <a:prstGeom prst="rect">
               <a:avLst/>
@@ -5858,8 +5925,8 @@
           </p:nvSpPr>
           <p:spPr>
             <a:xfrm>
-              <a:off x="4065723" y="3413150"/>
-              <a:ext cx="612775" cy="145857"/>
+              <a:off x="4066424" y="3412579"/>
+              <a:ext cx="611299" cy="146000"/>
             </a:xfrm>
             <a:prstGeom prst="rect">
               <a:avLst/>
@@ -5914,8 +5981,8 @@
           </p:nvSpPr>
           <p:spPr>
             <a:xfrm>
-              <a:off x="4062548" y="3559007"/>
-              <a:ext cx="612775" cy="145857"/>
+              <a:off x="4063249" y="3558579"/>
+              <a:ext cx="611299" cy="146000"/>
             </a:xfrm>
             <a:prstGeom prst="rect">
               <a:avLst/>
@@ -5970,8 +6037,8 @@
           </p:nvSpPr>
           <p:spPr>
             <a:xfrm>
-              <a:off x="4062548" y="3704864"/>
-              <a:ext cx="612775" cy="145857"/>
+              <a:off x="4063249" y="3704579"/>
+              <a:ext cx="611299" cy="146000"/>
             </a:xfrm>
             <a:prstGeom prst="rect">
               <a:avLst/>
@@ -6026,8 +6093,8 @@
           </p:nvSpPr>
           <p:spPr>
             <a:xfrm>
-              <a:off x="4062548" y="3850721"/>
-              <a:ext cx="612775" cy="145857"/>
+              <a:off x="4063249" y="3850578"/>
+              <a:ext cx="611299" cy="146000"/>
             </a:xfrm>
             <a:prstGeom prst="rect">
               <a:avLst/>
@@ -6083,7 +6150,7 @@
         </p:nvSpPr>
         <p:spPr>
           <a:xfrm>
-            <a:off x="4913487" y="5453946"/>
+            <a:off x="4913313" y="5454650"/>
             <a:ext cx="2133600" cy="609600"/>
           </a:xfrm>
           <a:prstGeom prst="rect">
@@ -6139,8 +6206,8 @@
         </p:nvSpPr>
         <p:spPr>
           <a:xfrm>
-            <a:off x="4227687" y="4402504"/>
-            <a:ext cx="2133600" cy="612648"/>
+            <a:off x="4227513" y="4402138"/>
+            <a:ext cx="2133600" cy="612775"/>
           </a:xfrm>
           <a:prstGeom prst="rect">
             <a:avLst/>
@@ -6199,8 +6266,8 @@
         </p:nvCxnSpPr>
         <p:spPr>
           <a:xfrm rot="16200000" flipH="1">
-            <a:off x="4423767" y="5269025"/>
-            <a:ext cx="751371" cy="228069"/>
+            <a:off x="4422775" y="5268913"/>
+            <a:ext cx="752475" cy="228600"/>
           </a:xfrm>
           <a:prstGeom prst="bentConnector2">
             <a:avLst/>
@@ -6229,7 +6296,7 @@
       </p:cxnSp>
       <p:sp>
         <p:nvSpPr>
-          <p:cNvPr id="129" name="TextBox 30"/>
+          <p:cNvPr id="14342" name="TextBox 30"/>
           <p:cNvSpPr txBox="1">
             <a:spLocks noChangeArrowheads="1"/>
           </p:cNvSpPr>
@@ -6237,8 +6304,8 @@
         </p:nvSpPr>
         <p:spPr bwMode="auto">
           <a:xfrm>
-            <a:off x="4133617" y="4038088"/>
-            <a:ext cx="1114646" cy="369332"/>
+            <a:off x="4133850" y="4038600"/>
+            <a:ext cx="1114425" cy="368300"/>
           </a:xfrm>
           <a:prstGeom prst="rect">
             <a:avLst/>
@@ -6258,20 +6325,17 @@
           <a:lstStyle/>
           <a:p>
             <a:r>
-              <a:rPr lang="en-US" dirty="0" smtClean="0">
+              <a:rPr lang="en-US">
                 <a:latin typeface="Calibri" pitchFamily="34" charset="0"/>
               </a:rPr>
               <a:t>LinkedList</a:t>
             </a:r>
-            <a:endParaRPr lang="en-US" dirty="0">
-              <a:latin typeface="Calibri" pitchFamily="34" charset="0"/>
-            </a:endParaRPr>
-          </a:p>
-        </p:txBody>
-      </p:sp>
-      <p:sp>
-        <p:nvSpPr>
-          <p:cNvPr id="130" name="TextBox 31"/>
+          </a:p>
+        </p:txBody>
+      </p:sp>
+      <p:sp>
+        <p:nvSpPr>
+          <p:cNvPr id="14343" name="TextBox 31"/>
           <p:cNvSpPr txBox="1">
             <a:spLocks noChangeArrowheads="1"/>
           </p:cNvSpPr>
@@ -6279,8 +6343,8 @@
         </p:nvSpPr>
         <p:spPr bwMode="auto">
           <a:xfrm>
-            <a:off x="4816543" y="5085645"/>
-            <a:ext cx="1727907" cy="369332"/>
+            <a:off x="4816475" y="5086350"/>
+            <a:ext cx="1727200" cy="368300"/>
           </a:xfrm>
           <a:prstGeom prst="rect">
             <a:avLst/>
@@ -6300,14 +6364,11 @@
           <a:lstStyle/>
           <a:p>
             <a:r>
-              <a:rPr lang="en-US" dirty="0" smtClean="0">
+              <a:rPr lang="en-US">
                 <a:latin typeface="Calibri" pitchFamily="34" charset="0"/>
               </a:rPr>
               <a:t>LinkedList$Entry</a:t>
             </a:r>
-            <a:endParaRPr lang="en-US" dirty="0">
-              <a:latin typeface="Calibri" pitchFamily="34" charset="0"/>
-            </a:endParaRPr>
           </a:p>
         </p:txBody>
       </p:sp>
@@ -6322,7 +6383,7 @@
         </p:nvCxnSpPr>
         <p:spPr>
           <a:xfrm rot="5400000" flipH="1" flipV="1">
-            <a:off x="6361287" y="5377746"/>
+            <a:off x="6361113" y="5378450"/>
             <a:ext cx="304800" cy="1066800"/>
           </a:xfrm>
           <a:prstGeom prst="bentConnector4">
@@ -6354,6 +6415,121 @@
           </a:fontRef>
         </p:style>
       </p:cxnSp>
+      <p:sp>
+        <p:nvSpPr>
+          <p:cNvPr id="14385" name="Rectangle 35"/>
+          <p:cNvSpPr>
+            <a:spLocks noChangeArrowheads="1"/>
+          </p:cNvSpPr>
+          <p:nvPr/>
+        </p:nvSpPr>
+        <p:spPr bwMode="auto">
+          <a:xfrm>
+            <a:off x="7018338" y="5275263"/>
+            <a:ext cx="1919287" cy="368300"/>
+          </a:xfrm>
+          <a:prstGeom prst="rect">
+            <a:avLst/>
+          </a:prstGeom>
+          <a:noFill/>
+          <a:ln w="9525">
+            <a:noFill/>
+            <a:miter lim="800000"/>
+            <a:headEnd/>
+            <a:tailEnd/>
+          </a:ln>
+        </p:spPr>
+        <p:txBody>
+          <a:bodyPr/>
+          <a:lstStyle/>
+          <a:p>
+            <a:r>
+              <a:rPr lang="en-US" i="1">
+                <a:latin typeface="Calibri" pitchFamily="34" charset="0"/>
+              </a:rPr>
+              <a:t>Sentinel</a:t>
+            </a:r>
+          </a:p>
+        </p:txBody>
+      </p:sp>
+      <p:sp>
+        <p:nvSpPr>
+          <p:cNvPr id="14386" name="Rectangle 37"/>
+          <p:cNvSpPr>
+            <a:spLocks noChangeArrowheads="1"/>
+          </p:cNvSpPr>
+          <p:nvPr/>
+        </p:nvSpPr>
+        <p:spPr bwMode="auto">
+          <a:xfrm>
+            <a:off x="71438" y="4452938"/>
+            <a:ext cx="1993900" cy="366712"/>
+          </a:xfrm>
+          <a:prstGeom prst="rect">
+            <a:avLst/>
+          </a:prstGeom>
+          <a:noFill/>
+          <a:ln w="9525">
+            <a:noFill/>
+            <a:miter lim="800000"/>
+            <a:headEnd/>
+            <a:tailEnd/>
+          </a:ln>
+        </p:spPr>
+        <p:txBody>
+          <a:bodyPr>
+            <a:spAutoFit/>
+          </a:bodyPr>
+          <a:lstStyle/>
+          <a:p>
+            <a:r>
+              <a:rPr lang="en-US" i="1">
+                <a:latin typeface="Calibri" pitchFamily="34" charset="0"/>
+              </a:rPr>
+              <a:t>Default capacity 16</a:t>
+            </a:r>
+          </a:p>
+        </p:txBody>
+      </p:sp>
+      <p:sp>
+        <p:nvSpPr>
+          <p:cNvPr id="14387" name="Rectangle 37"/>
+          <p:cNvSpPr>
+            <a:spLocks noChangeArrowheads="1"/>
+          </p:cNvSpPr>
+          <p:nvPr/>
+        </p:nvSpPr>
+        <p:spPr bwMode="auto">
+          <a:xfrm>
+            <a:off x="5184775" y="3114675"/>
+            <a:ext cx="2009775" cy="366713"/>
+          </a:xfrm>
+          <a:prstGeom prst="rect">
+            <a:avLst/>
+          </a:prstGeom>
+          <a:noFill/>
+          <a:ln w="9525">
+            <a:noFill/>
+            <a:miter lim="800000"/>
+            <a:headEnd/>
+            <a:tailEnd/>
+          </a:ln>
+        </p:spPr>
+        <p:txBody>
+          <a:bodyPr>
+            <a:spAutoFit/>
+          </a:bodyPr>
+          <a:lstStyle/>
+          <a:p>
+            <a:r>
+              <a:rPr lang="en-US" i="1">
+                <a:latin typeface="Calibri" pitchFamily="34" charset="0"/>
+              </a:rPr>
+              <a:t>Default capacity 10</a:t>
+            </a:r>
+          </a:p>
+        </p:txBody>
+      </p:sp>
     </p:spTree>
   </p:cSld>
   <p:clrMapOvr>

</xml_diff>

<commit_message>
Undid changes to figure.
</commit_message>
<xml_diff>
--- a/part1/Figures/collections/inside-empty.pptx
+++ b/part1/Figures/collections/inside-empty.pptx
@@ -185,14 +185,11 @@
           <a:bodyPr vert="horz" lIns="91440" tIns="45720" rIns="91440" bIns="45720" rtlCol="0"/>
           <a:lstStyle>
             <a:lvl1pPr algn="l">
-              <a:defRPr sz="1200" dirty="0"/>
+              <a:defRPr sz="1200"/>
             </a:lvl1pPr>
           </a:lstStyle>
           <a:p>
-            <a:pPr>
-              <a:defRPr/>
-            </a:pPr>
-            <a:endParaRPr lang="en-US"/>
+            <a:endParaRPr lang="en-US" dirty="0"/>
           </a:p>
         </p:txBody>
       </p:sp>
@@ -219,19 +216,13 @@
           <a:bodyPr vert="horz" lIns="91440" tIns="45720" rIns="91440" bIns="45720" rtlCol="0"/>
           <a:lstStyle>
             <a:lvl1pPr algn="r">
-              <a:defRPr sz="1200" smtClean="0"/>
+              <a:defRPr sz="1200"/>
             </a:lvl1pPr>
           </a:lstStyle>
           <a:p>
-            <a:pPr>
-              <a:defRPr/>
-            </a:pPr>
-            <a:fld id="{F09904DC-5009-483D-9B17-0387E002608D}" type="datetimeFigureOut">
-              <a:rPr lang="en-US"/>
-              <a:pPr>
-                <a:defRPr/>
-              </a:pPr>
-              <a:t>8/13/2012</a:t>
+            <a:fld id="{63399E6A-A389-3547-948A-FA1167BEF3D4}" type="datetimeFigureOut">
+              <a:rPr lang="en-US" smtClean="0"/>
+              <a:t>7/6/12</a:t>
             </a:fld>
             <a:endParaRPr lang="en-US" dirty="0"/>
           </a:p>
@@ -266,8 +257,7 @@
           <a:bodyPr vert="horz" lIns="91440" tIns="45720" rIns="91440" bIns="45720" rtlCol="0" anchor="ctr"/>
           <a:lstStyle/>
           <a:p>
-            <a:pPr lvl="0"/>
-            <a:endParaRPr lang="en-US" noProof="0" dirty="0"/>
+            <a:endParaRPr lang="en-US" dirty="0"/>
           </a:p>
         </p:txBody>
       </p:sp>
@@ -296,38 +286,38 @@
           <a:p>
             <a:pPr lvl="0"/>
             <a:r>
-              <a:rPr lang="en-US" noProof="0" smtClean="0"/>
+              <a:rPr lang="en-US" smtClean="0"/>
               <a:t>Click to edit Master text styles</a:t>
             </a:r>
           </a:p>
           <a:p>
             <a:pPr lvl="1"/>
             <a:r>
-              <a:rPr lang="en-US" noProof="0" smtClean="0"/>
+              <a:rPr lang="en-US" smtClean="0"/>
               <a:t>Second level</a:t>
             </a:r>
           </a:p>
           <a:p>
             <a:pPr lvl="2"/>
             <a:r>
-              <a:rPr lang="en-US" noProof="0" smtClean="0"/>
+              <a:rPr lang="en-US" smtClean="0"/>
               <a:t>Third level</a:t>
             </a:r>
           </a:p>
           <a:p>
             <a:pPr lvl="3"/>
             <a:r>
-              <a:rPr lang="en-US" noProof="0" smtClean="0"/>
+              <a:rPr lang="en-US" smtClean="0"/>
               <a:t>Fourth level</a:t>
             </a:r>
           </a:p>
           <a:p>
             <a:pPr lvl="4"/>
             <a:r>
-              <a:rPr lang="en-US" noProof="0" smtClean="0"/>
+              <a:rPr lang="en-US" smtClean="0"/>
               <a:t>Fifth level</a:t>
             </a:r>
-            <a:endParaRPr lang="en-US" noProof="0"/>
+            <a:endParaRPr lang="en-US"/>
           </a:p>
         </p:txBody>
       </p:sp>
@@ -354,14 +344,11 @@
           <a:bodyPr vert="horz" lIns="91440" tIns="45720" rIns="91440" bIns="45720" rtlCol="0" anchor="b"/>
           <a:lstStyle>
             <a:lvl1pPr algn="l">
-              <a:defRPr sz="1200" dirty="0"/>
+              <a:defRPr sz="1200"/>
             </a:lvl1pPr>
           </a:lstStyle>
           <a:p>
-            <a:pPr>
-              <a:defRPr/>
-            </a:pPr>
-            <a:endParaRPr lang="en-US"/>
+            <a:endParaRPr lang="en-US" dirty="0"/>
           </a:p>
         </p:txBody>
       </p:sp>
@@ -388,18 +375,12 @@
           <a:bodyPr vert="horz" lIns="91440" tIns="45720" rIns="91440" bIns="45720" rtlCol="0" anchor="b"/>
           <a:lstStyle>
             <a:lvl1pPr algn="r">
-              <a:defRPr sz="1200" smtClean="0"/>
+              <a:defRPr sz="1200"/>
             </a:lvl1pPr>
           </a:lstStyle>
           <a:p>
-            <a:pPr>
-              <a:defRPr/>
-            </a:pPr>
-            <a:fld id="{9C0FB4A7-B3EC-4A9A-9EC1-77E36F549EEB}" type="slidenum">
-              <a:rPr lang="en-US"/>
-              <a:pPr>
-                <a:defRPr/>
-              </a:pPr>
+            <a:fld id="{26E6EE75-3F2A-9041-8B1A-2272835C97F9}" type="slidenum">
+              <a:rPr lang="en-US" smtClean="0"/>
               <a:t>‹#›</a:t>
             </a:fld>
             <a:endParaRPr lang="en-US" dirty="0"/>
@@ -407,16 +388,15 @@
         </p:txBody>
       </p:sp>
     </p:spTree>
+    <p:extLst>
+      <p:ext uri="{BB962C8B-B14F-4D97-AF65-F5344CB8AC3E}">
+        <p14:creationId xmlns:p14="http://schemas.microsoft.com/office/powerpoint/2010/main" val="1933097513"/>
+      </p:ext>
+    </p:extLst>
   </p:cSld>
   <p:clrMap bg1="lt1" tx1="dk1" bg2="lt2" tx2="dk2" accent1="accent1" accent2="accent2" accent3="accent3" accent4="accent4" accent5="accent5" accent6="accent6" hlink="hlink" folHlink="folHlink"/>
   <p:notesStyle>
-    <a:lvl1pPr algn="l" defTabSz="457200" rtl="0" fontAlgn="base">
-      <a:spcBef>
-        <a:spcPct val="30000"/>
-      </a:spcBef>
-      <a:spcAft>
-        <a:spcPct val="0"/>
-      </a:spcAft>
+    <a:lvl1pPr marL="0" algn="l" defTabSz="457200" rtl="0" eaLnBrk="1" latinLnBrk="0" hangingPunct="1">
       <a:defRPr sz="1200" kern="1200">
         <a:solidFill>
           <a:schemeClr val="tx1"/>
@@ -426,13 +406,7 @@
         <a:cs typeface="+mn-cs"/>
       </a:defRPr>
     </a:lvl1pPr>
-    <a:lvl2pPr marL="457200" algn="l" defTabSz="457200" rtl="0" fontAlgn="base">
-      <a:spcBef>
-        <a:spcPct val="30000"/>
-      </a:spcBef>
-      <a:spcAft>
-        <a:spcPct val="0"/>
-      </a:spcAft>
+    <a:lvl2pPr marL="457200" algn="l" defTabSz="457200" rtl="0" eaLnBrk="1" latinLnBrk="0" hangingPunct="1">
       <a:defRPr sz="1200" kern="1200">
         <a:solidFill>
           <a:schemeClr val="tx1"/>
@@ -442,13 +416,7 @@
         <a:cs typeface="+mn-cs"/>
       </a:defRPr>
     </a:lvl2pPr>
-    <a:lvl3pPr marL="914400" algn="l" defTabSz="457200" rtl="0" fontAlgn="base">
-      <a:spcBef>
-        <a:spcPct val="30000"/>
-      </a:spcBef>
-      <a:spcAft>
-        <a:spcPct val="0"/>
-      </a:spcAft>
+    <a:lvl3pPr marL="914400" algn="l" defTabSz="457200" rtl="0" eaLnBrk="1" latinLnBrk="0" hangingPunct="1">
       <a:defRPr sz="1200" kern="1200">
         <a:solidFill>
           <a:schemeClr val="tx1"/>
@@ -458,13 +426,7 @@
         <a:cs typeface="+mn-cs"/>
       </a:defRPr>
     </a:lvl3pPr>
-    <a:lvl4pPr marL="1371600" algn="l" defTabSz="457200" rtl="0" fontAlgn="base">
-      <a:spcBef>
-        <a:spcPct val="30000"/>
-      </a:spcBef>
-      <a:spcAft>
-        <a:spcPct val="0"/>
-      </a:spcAft>
+    <a:lvl4pPr marL="1371600" algn="l" defTabSz="457200" rtl="0" eaLnBrk="1" latinLnBrk="0" hangingPunct="1">
       <a:defRPr sz="1200" kern="1200">
         <a:solidFill>
           <a:schemeClr val="tx1"/>
@@ -474,13 +436,7 @@
         <a:cs typeface="+mn-cs"/>
       </a:defRPr>
     </a:lvl4pPr>
-    <a:lvl5pPr marL="1828800" algn="l" defTabSz="457200" rtl="0" fontAlgn="base">
-      <a:spcBef>
-        <a:spcPct val="30000"/>
-      </a:spcBef>
-      <a:spcAft>
-        <a:spcPct val="0"/>
-      </a:spcAft>
+    <a:lvl5pPr marL="1828800" algn="l" defTabSz="457200" rtl="0" eaLnBrk="1" latinLnBrk="0" hangingPunct="1">
       <a:defRPr sz="1200" kern="1200">
         <a:solidFill>
           <a:schemeClr val="tx1"/>
@@ -553,7 +509,7 @@
       </p:grpSpPr>
       <p:sp>
         <p:nvSpPr>
-          <p:cNvPr id="15361" name="Slide Image Placeholder 1"/>
+          <p:cNvPr id="2" name="Slide Image Placeholder 1"/>
           <p:cNvSpPr>
             <a:spLocks noGrp="1" noRot="1" noChangeAspect="1"/>
           </p:cNvSpPr>
@@ -561,21 +517,11 @@
             <p:ph type="sldImg"/>
           </p:nvPr>
         </p:nvSpPr>
-        <p:spPr bwMode="auto">
-          <a:noFill/>
-          <a:ln>
-            <a:solidFill>
-              <a:srgbClr val="000000"/>
-            </a:solidFill>
-            <a:miter lim="800000"/>
-            <a:headEnd/>
-            <a:tailEnd/>
-          </a:ln>
-        </p:spPr>
-      </p:sp>
-      <p:sp>
-        <p:nvSpPr>
-          <p:cNvPr id="15362" name="Notes Placeholder 2"/>
+        <p:spPr/>
+      </p:sp>
+      <p:sp>
+        <p:nvSpPr>
+          <p:cNvPr id="3" name="Notes Placeholder 2"/>
           <p:cNvSpPr>
             <a:spLocks noGrp="1"/>
           </p:cNvSpPr>
@@ -583,62 +529,44 @@
             <p:ph type="body" idx="1"/>
           </p:nvPr>
         </p:nvSpPr>
-        <p:spPr bwMode="auto">
-          <a:noFill/>
-        </p:spPr>
-        <p:txBody>
-          <a:bodyPr wrap="square" numCol="1" anchor="t" anchorCtr="0" compatLnSpc="1">
-            <a:prstTxWarp prst="textNoShape">
-              <a:avLst/>
-            </a:prstTxWarp>
-          </a:bodyPr>
+        <p:spPr/>
+        <p:txBody>
+          <a:bodyPr/>
           <a:lstStyle/>
           <a:p>
-            <a:pPr>
-              <a:spcBef>
-                <a:spcPct val="0"/>
-              </a:spcBef>
-            </a:pPr>
-            <a:endParaRPr lang="en-US" smtClean="0"/>
-          </a:p>
-        </p:txBody>
-      </p:sp>
-      <p:sp>
-        <p:nvSpPr>
-          <p:cNvPr id="15363" name="Slide Number Placeholder 3"/>
+            <a:endParaRPr lang="en-US" dirty="0"/>
+          </a:p>
+        </p:txBody>
+      </p:sp>
+      <p:sp>
+        <p:nvSpPr>
+          <p:cNvPr id="4" name="Slide Number Placeholder 3"/>
           <p:cNvSpPr>
             <a:spLocks noGrp="1"/>
           </p:cNvSpPr>
           <p:nvPr>
-            <p:ph type="sldNum" sz="quarter" idx="5"/>
-          </p:nvPr>
-        </p:nvSpPr>
-        <p:spPr bwMode="auto">
-          <a:noFill/>
-          <a:ln>
-            <a:miter lim="800000"/>
-            <a:headEnd/>
-            <a:tailEnd/>
-          </a:ln>
-        </p:spPr>
-        <p:txBody>
-          <a:bodyPr wrap="square" numCol="1" anchorCtr="0" compatLnSpc="1">
-            <a:prstTxWarp prst="textNoShape">
-              <a:avLst/>
-            </a:prstTxWarp>
-          </a:bodyPr>
+            <p:ph type="sldNum" sz="quarter" idx="10"/>
+          </p:nvPr>
+        </p:nvSpPr>
+        <p:spPr/>
+        <p:txBody>
+          <a:bodyPr/>
           <a:lstStyle/>
           <a:p>
-            <a:fld id="{DB97EC96-DF67-4439-9FD0-07FA4FE06558}" type="slidenum">
-              <a:rPr lang="en-US"/>
-              <a:pPr/>
+            <a:fld id="{26E6EE75-3F2A-9041-8B1A-2272835C97F9}" type="slidenum">
+              <a:rPr lang="en-US" smtClean="0"/>
               <a:t>1</a:t>
             </a:fld>
-            <a:endParaRPr lang="en-US"/>
+            <a:endParaRPr lang="en-US" dirty="0"/>
           </a:p>
         </p:txBody>
       </p:sp>
     </p:spTree>
+    <p:extLst>
+      <p:ext uri="{BB962C8B-B14F-4D97-AF65-F5344CB8AC3E}">
+        <p14:creationId xmlns:p14="http://schemas.microsoft.com/office/powerpoint/2010/main" val="3516954612"/>
+      </p:ext>
+    </p:extLst>
   </p:cSld>
   <p:clrMapOvr>
     <a:masterClrMapping/>
@@ -832,12 +760,12 @@
             <a:pPr>
               <a:defRPr/>
             </a:pPr>
-            <a:fld id="{8B2189E3-293D-4473-AE92-89B666198920}" type="datetimeFigureOut">
+            <a:fld id="{EA869C11-907D-4A7F-9EA7-EFD46A12E100}" type="datetimeFigureOut">
               <a:rPr lang="en-US"/>
               <a:pPr>
                 <a:defRPr/>
               </a:pPr>
-              <a:t>8/13/2012</a:t>
+              <a:t>7/6/12</a:t>
             </a:fld>
             <a:endParaRPr lang="en-US" dirty="0"/>
           </a:p>
@@ -865,7 +793,7 @@
             <a:pPr>
               <a:defRPr/>
             </a:pPr>
-            <a:endParaRPr lang="en-US"/>
+            <a:endParaRPr lang="en-US" dirty="0"/>
           </a:p>
         </p:txBody>
       </p:sp>
@@ -891,7 +819,7 @@
             <a:pPr>
               <a:defRPr/>
             </a:pPr>
-            <a:fld id="{5AD0F7E9-BB42-431E-BBAF-0067466DEC32}" type="slidenum">
+            <a:fld id="{C80855D0-533B-4B6F-AF0D-03BF56607AB1}" type="slidenum">
               <a:rPr lang="en-US"/>
               <a:pPr>
                 <a:defRPr/>
@@ -1024,12 +952,12 @@
             <a:pPr>
               <a:defRPr/>
             </a:pPr>
-            <a:fld id="{A365B3D8-C070-4723-AB7C-602C55A994B2}" type="datetimeFigureOut">
+            <a:fld id="{0467ED37-AAA3-4EAD-A830-705697ADDE64}" type="datetimeFigureOut">
               <a:rPr lang="en-US"/>
               <a:pPr>
                 <a:defRPr/>
               </a:pPr>
-              <a:t>8/13/2012</a:t>
+              <a:t>7/6/12</a:t>
             </a:fld>
             <a:endParaRPr lang="en-US" dirty="0"/>
           </a:p>
@@ -1057,7 +985,7 @@
             <a:pPr>
               <a:defRPr/>
             </a:pPr>
-            <a:endParaRPr lang="en-US"/>
+            <a:endParaRPr lang="en-US" dirty="0"/>
           </a:p>
         </p:txBody>
       </p:sp>
@@ -1083,7 +1011,7 @@
             <a:pPr>
               <a:defRPr/>
             </a:pPr>
-            <a:fld id="{234F29CA-A794-4BC4-B673-F3800D6709E8}" type="slidenum">
+            <a:fld id="{191A86E2-A51C-42C9-AEA2-FEBB4B52279B}" type="slidenum">
               <a:rPr lang="en-US"/>
               <a:pPr>
                 <a:defRPr/>
@@ -1226,12 +1154,12 @@
             <a:pPr>
               <a:defRPr/>
             </a:pPr>
-            <a:fld id="{0E6EE670-6F7A-4E10-9E33-D57EC3C51B99}" type="datetimeFigureOut">
+            <a:fld id="{24F69AC6-04E4-4F60-B85D-479D1FB806BE}" type="datetimeFigureOut">
               <a:rPr lang="en-US"/>
               <a:pPr>
                 <a:defRPr/>
               </a:pPr>
-              <a:t>8/13/2012</a:t>
+              <a:t>7/6/12</a:t>
             </a:fld>
             <a:endParaRPr lang="en-US" dirty="0"/>
           </a:p>
@@ -1259,7 +1187,7 @@
             <a:pPr>
               <a:defRPr/>
             </a:pPr>
-            <a:endParaRPr lang="en-US"/>
+            <a:endParaRPr lang="en-US" dirty="0"/>
           </a:p>
         </p:txBody>
       </p:sp>
@@ -1285,7 +1213,7 @@
             <a:pPr>
               <a:defRPr/>
             </a:pPr>
-            <a:fld id="{63066AC8-EBE7-4FCC-807D-225E57D1E20F}" type="slidenum">
+            <a:fld id="{607962A7-0C62-4D1F-95BE-035BE58672D9}" type="slidenum">
               <a:rPr lang="en-US"/>
               <a:pPr>
                 <a:defRPr/>
@@ -1418,12 +1346,12 @@
             <a:pPr>
               <a:defRPr/>
             </a:pPr>
-            <a:fld id="{A578BC2C-668E-4C21-8656-17F3D3C895B2}" type="datetimeFigureOut">
+            <a:fld id="{C44A5AF7-AB9C-430F-ACB2-70583A16FFF2}" type="datetimeFigureOut">
               <a:rPr lang="en-US"/>
               <a:pPr>
                 <a:defRPr/>
               </a:pPr>
-              <a:t>8/13/2012</a:t>
+              <a:t>7/6/12</a:t>
             </a:fld>
             <a:endParaRPr lang="en-US" dirty="0"/>
           </a:p>
@@ -1451,7 +1379,7 @@
             <a:pPr>
               <a:defRPr/>
             </a:pPr>
-            <a:endParaRPr lang="en-US"/>
+            <a:endParaRPr lang="en-US" dirty="0"/>
           </a:p>
         </p:txBody>
       </p:sp>
@@ -1477,7 +1405,7 @@
             <a:pPr>
               <a:defRPr/>
             </a:pPr>
-            <a:fld id="{74B08212-4EDE-49F1-A5D4-0FC936F6029C}" type="slidenum">
+            <a:fld id="{57736D0B-2229-4661-AA7E-7FFAED76AF03}" type="slidenum">
               <a:rPr lang="en-US"/>
               <a:pPr>
                 <a:defRPr/>
@@ -1686,12 +1614,12 @@
             <a:pPr>
               <a:defRPr/>
             </a:pPr>
-            <a:fld id="{DE7921EC-BA25-402E-8AA6-2F56E0CC4F5B}" type="datetimeFigureOut">
+            <a:fld id="{201E5E0F-B8C0-4ABA-9C6F-CD47FF03D444}" type="datetimeFigureOut">
               <a:rPr lang="en-US"/>
               <a:pPr>
                 <a:defRPr/>
               </a:pPr>
-              <a:t>8/13/2012</a:t>
+              <a:t>7/6/12</a:t>
             </a:fld>
             <a:endParaRPr lang="en-US" dirty="0"/>
           </a:p>
@@ -1719,7 +1647,7 @@
             <a:pPr>
               <a:defRPr/>
             </a:pPr>
-            <a:endParaRPr lang="en-US"/>
+            <a:endParaRPr lang="en-US" dirty="0"/>
           </a:p>
         </p:txBody>
       </p:sp>
@@ -1745,7 +1673,7 @@
             <a:pPr>
               <a:defRPr/>
             </a:pPr>
-            <a:fld id="{0EB73CC7-52FF-4C3E-AE7D-11CFCA51303E}" type="slidenum">
+            <a:fld id="{3D1619AF-B268-45A6-AA9D-F07579FEC687}" type="slidenum">
               <a:rPr lang="en-US"/>
               <a:pPr>
                 <a:defRPr/>
@@ -1996,12 +1924,12 @@
             <a:pPr>
               <a:defRPr/>
             </a:pPr>
-            <a:fld id="{84A5E1B1-00EC-442C-8BAD-9A0F781C6F6D}" type="datetimeFigureOut">
+            <a:fld id="{EBF747BF-6E29-4437-AC11-2005B4CB9278}" type="datetimeFigureOut">
               <a:rPr lang="en-US"/>
               <a:pPr>
                 <a:defRPr/>
               </a:pPr>
-              <a:t>8/13/2012</a:t>
+              <a:t>7/6/12</a:t>
             </a:fld>
             <a:endParaRPr lang="en-US" dirty="0"/>
           </a:p>
@@ -2029,7 +1957,7 @@
             <a:pPr>
               <a:defRPr/>
             </a:pPr>
-            <a:endParaRPr lang="en-US"/>
+            <a:endParaRPr lang="en-US" dirty="0"/>
           </a:p>
         </p:txBody>
       </p:sp>
@@ -2055,7 +1983,7 @@
             <a:pPr>
               <a:defRPr/>
             </a:pPr>
-            <a:fld id="{66308336-9F81-470D-A6E0-10D72892B75C}" type="slidenum">
+            <a:fld id="{DFF1E6BD-0AED-4CA9-9911-18A254D86A0B}" type="slidenum">
               <a:rPr lang="en-US"/>
               <a:pPr>
                 <a:defRPr/>
@@ -2440,12 +2368,12 @@
             <a:pPr>
               <a:defRPr/>
             </a:pPr>
-            <a:fld id="{3C5D734D-22AA-4253-BC26-EE7B86ED82F6}" type="datetimeFigureOut">
+            <a:fld id="{B33299F7-6BA2-4DC5-800A-D39A11919286}" type="datetimeFigureOut">
               <a:rPr lang="en-US"/>
               <a:pPr>
                 <a:defRPr/>
               </a:pPr>
-              <a:t>8/13/2012</a:t>
+              <a:t>7/6/12</a:t>
             </a:fld>
             <a:endParaRPr lang="en-US" dirty="0"/>
           </a:p>
@@ -2473,7 +2401,7 @@
             <a:pPr>
               <a:defRPr/>
             </a:pPr>
-            <a:endParaRPr lang="en-US"/>
+            <a:endParaRPr lang="en-US" dirty="0"/>
           </a:p>
         </p:txBody>
       </p:sp>
@@ -2499,7 +2427,7 @@
             <a:pPr>
               <a:defRPr/>
             </a:pPr>
-            <a:fld id="{2041ACC5-75D4-440D-8734-FC564C1447CD}" type="slidenum">
+            <a:fld id="{AA45CA4C-7773-4BB3-92F9-3B1E2FCC57F3}" type="slidenum">
               <a:rPr lang="en-US"/>
               <a:pPr>
                 <a:defRPr/>
@@ -2580,12 +2508,12 @@
             <a:pPr>
               <a:defRPr/>
             </a:pPr>
-            <a:fld id="{6E2C4EE2-292A-4028-8B81-4EAA31C1428B}" type="datetimeFigureOut">
+            <a:fld id="{25C03C68-02DE-4C4E-941A-96ECF28F7C67}" type="datetimeFigureOut">
               <a:rPr lang="en-US"/>
               <a:pPr>
                 <a:defRPr/>
               </a:pPr>
-              <a:t>8/13/2012</a:t>
+              <a:t>7/6/12</a:t>
             </a:fld>
             <a:endParaRPr lang="en-US" dirty="0"/>
           </a:p>
@@ -2613,7 +2541,7 @@
             <a:pPr>
               <a:defRPr/>
             </a:pPr>
-            <a:endParaRPr lang="en-US"/>
+            <a:endParaRPr lang="en-US" dirty="0"/>
           </a:p>
         </p:txBody>
       </p:sp>
@@ -2639,7 +2567,7 @@
             <a:pPr>
               <a:defRPr/>
             </a:pPr>
-            <a:fld id="{230998A9-CB1B-4EB5-B220-69AF666C644A}" type="slidenum">
+            <a:fld id="{7F04C4E5-A64F-4658-BAC7-979F6381C29E}" type="slidenum">
               <a:rPr lang="en-US"/>
               <a:pPr>
                 <a:defRPr/>
@@ -2697,12 +2625,12 @@
             <a:pPr>
               <a:defRPr/>
             </a:pPr>
-            <a:fld id="{A9A918CE-0DAA-4989-AF7A-EDA8DDA82461}" type="datetimeFigureOut">
+            <a:fld id="{D9A589FA-27C3-4FD1-B7A7-82FFAEF89949}" type="datetimeFigureOut">
               <a:rPr lang="en-US"/>
               <a:pPr>
                 <a:defRPr/>
               </a:pPr>
-              <a:t>8/13/2012</a:t>
+              <a:t>7/6/12</a:t>
             </a:fld>
             <a:endParaRPr lang="en-US" dirty="0"/>
           </a:p>
@@ -2730,7 +2658,7 @@
             <a:pPr>
               <a:defRPr/>
             </a:pPr>
-            <a:endParaRPr lang="en-US"/>
+            <a:endParaRPr lang="en-US" dirty="0"/>
           </a:p>
         </p:txBody>
       </p:sp>
@@ -2756,7 +2684,7 @@
             <a:pPr>
               <a:defRPr/>
             </a:pPr>
-            <a:fld id="{69F7BEE7-91D5-4B37-B46B-386717C6D6C8}" type="slidenum">
+            <a:fld id="{AD2585F0-FCA0-4BA4-80AD-C2DC395DB445}" type="slidenum">
               <a:rPr lang="en-US"/>
               <a:pPr>
                 <a:defRPr/>
@@ -2996,12 +2924,12 @@
             <a:pPr>
               <a:defRPr/>
             </a:pPr>
-            <a:fld id="{7A53EF31-1FBE-4A5C-9117-977CF69B2FAC}" type="datetimeFigureOut">
+            <a:fld id="{7B5ADE40-7230-43BF-9A60-976B754BB36D}" type="datetimeFigureOut">
               <a:rPr lang="en-US"/>
               <a:pPr>
                 <a:defRPr/>
               </a:pPr>
-              <a:t>8/13/2012</a:t>
+              <a:t>7/6/12</a:t>
             </a:fld>
             <a:endParaRPr lang="en-US" dirty="0"/>
           </a:p>
@@ -3029,7 +2957,7 @@
             <a:pPr>
               <a:defRPr/>
             </a:pPr>
-            <a:endParaRPr lang="en-US"/>
+            <a:endParaRPr lang="en-US" dirty="0"/>
           </a:p>
         </p:txBody>
       </p:sp>
@@ -3055,7 +2983,7 @@
             <a:pPr>
               <a:defRPr/>
             </a:pPr>
-            <a:fld id="{3B8BDBDE-242D-4D05-B74F-AD4760CAE6C1}" type="slidenum">
+            <a:fld id="{26D76953-EE80-4FAF-B5CF-0E397D49EF9B}" type="slidenum">
               <a:rPr lang="en-US"/>
               <a:pPr>
                 <a:defRPr/>
@@ -3274,12 +3202,12 @@
             <a:pPr>
               <a:defRPr/>
             </a:pPr>
-            <a:fld id="{1DEEC612-6971-4DC5-A9BC-941541A4F8CB}" type="datetimeFigureOut">
+            <a:fld id="{FEFFC9D6-420E-4A04-BCC6-71D068D97AFE}" type="datetimeFigureOut">
               <a:rPr lang="en-US"/>
               <a:pPr>
                 <a:defRPr/>
               </a:pPr>
-              <a:t>8/13/2012</a:t>
+              <a:t>7/6/12</a:t>
             </a:fld>
             <a:endParaRPr lang="en-US" dirty="0"/>
           </a:p>
@@ -3307,7 +3235,7 @@
             <a:pPr>
               <a:defRPr/>
             </a:pPr>
-            <a:endParaRPr lang="en-US"/>
+            <a:endParaRPr lang="en-US" dirty="0"/>
           </a:p>
         </p:txBody>
       </p:sp>
@@ -3333,7 +3261,7 @@
             <a:pPr>
               <a:defRPr/>
             </a:pPr>
-            <a:fld id="{2BF5544B-AA3A-4C73-BC31-09CA11077BE1}" type="slidenum">
+            <a:fld id="{5E817595-02ED-404B-B6B7-34656E1A59B0}" type="slidenum">
               <a:rPr lang="en-US"/>
               <a:pPr>
                 <a:defRPr/>
@@ -3515,7 +3443,7 @@
               <a:spcAft>
                 <a:spcPts val="0"/>
               </a:spcAft>
-              <a:defRPr sz="1200">
+              <a:defRPr sz="1200" smtClean="0">
                 <a:solidFill>
                   <a:schemeClr val="tx1">
                     <a:tint val="75000"/>
@@ -3530,12 +3458,12 @@
             <a:pPr>
               <a:defRPr/>
             </a:pPr>
-            <a:fld id="{7346E4F5-01E9-48BA-B072-C3844D848CA3}" type="datetimeFigureOut">
+            <a:fld id="{53920EE2-9CA1-4F3F-9FD5-0673D5D0DB53}" type="datetimeFigureOut">
               <a:rPr lang="en-US"/>
               <a:pPr>
                 <a:defRPr/>
               </a:pPr>
-              <a:t>8/13/2012</a:t>
+              <a:t>7/6/12</a:t>
             </a:fld>
             <a:endParaRPr lang="en-US" dirty="0"/>
           </a:p>
@@ -3564,54 +3492,6 @@
           <a:bodyPr vert="horz" lIns="91440" tIns="45720" rIns="91440" bIns="45720" rtlCol="0" anchor="ctr"/>
           <a:lstStyle>
             <a:lvl1pPr algn="ctr" fontAlgn="auto">
-              <a:spcBef>
-                <a:spcPts val="0"/>
-              </a:spcBef>
-              <a:spcAft>
-                <a:spcPts val="0"/>
-              </a:spcAft>
-              <a:defRPr sz="1200" dirty="0">
-                <a:solidFill>
-                  <a:schemeClr val="tx1">
-                    <a:tint val="75000"/>
-                  </a:schemeClr>
-                </a:solidFill>
-                <a:latin typeface="+mn-lt"/>
-                <a:cs typeface="+mn-cs"/>
-              </a:defRPr>
-            </a:lvl1pPr>
-          </a:lstStyle>
-          <a:p>
-            <a:pPr>
-              <a:defRPr/>
-            </a:pPr>
-            <a:endParaRPr lang="en-US"/>
-          </a:p>
-        </p:txBody>
-      </p:sp>
-      <p:sp>
-        <p:nvSpPr>
-          <p:cNvPr id="6" name="Slide Number Placeholder 5"/>
-          <p:cNvSpPr>
-            <a:spLocks noGrp="1"/>
-          </p:cNvSpPr>
-          <p:nvPr>
-            <p:ph type="sldNum" sz="quarter" idx="4"/>
-          </p:nvPr>
-        </p:nvSpPr>
-        <p:spPr>
-          <a:xfrm>
-            <a:off x="6553200" y="6356350"/>
-            <a:ext cx="2133600" cy="365125"/>
-          </a:xfrm>
-          <a:prstGeom prst="rect">
-            <a:avLst/>
-          </a:prstGeom>
-        </p:spPr>
-        <p:txBody>
-          <a:bodyPr vert="horz" lIns="91440" tIns="45720" rIns="91440" bIns="45720" rtlCol="0" anchor="ctr"/>
-          <a:lstStyle>
-            <a:lvl1pPr algn="r" fontAlgn="auto">
               <a:spcBef>
                 <a:spcPts val="0"/>
               </a:spcBef>
@@ -3633,7 +3513,55 @@
             <a:pPr>
               <a:defRPr/>
             </a:pPr>
-            <a:fld id="{C6EA8086-9F52-40EB-8386-FA2F31A75778}" type="slidenum">
+            <a:endParaRPr lang="en-US" dirty="0"/>
+          </a:p>
+        </p:txBody>
+      </p:sp>
+      <p:sp>
+        <p:nvSpPr>
+          <p:cNvPr id="6" name="Slide Number Placeholder 5"/>
+          <p:cNvSpPr>
+            <a:spLocks noGrp="1"/>
+          </p:cNvSpPr>
+          <p:nvPr>
+            <p:ph type="sldNum" sz="quarter" idx="4"/>
+          </p:nvPr>
+        </p:nvSpPr>
+        <p:spPr>
+          <a:xfrm>
+            <a:off x="6553200" y="6356350"/>
+            <a:ext cx="2133600" cy="365125"/>
+          </a:xfrm>
+          <a:prstGeom prst="rect">
+            <a:avLst/>
+          </a:prstGeom>
+        </p:spPr>
+        <p:txBody>
+          <a:bodyPr vert="horz" lIns="91440" tIns="45720" rIns="91440" bIns="45720" rtlCol="0" anchor="ctr"/>
+          <a:lstStyle>
+            <a:lvl1pPr algn="r" fontAlgn="auto">
+              <a:spcBef>
+                <a:spcPts val="0"/>
+              </a:spcBef>
+              <a:spcAft>
+                <a:spcPts val="0"/>
+              </a:spcAft>
+              <a:defRPr sz="1200" smtClean="0">
+                <a:solidFill>
+                  <a:schemeClr val="tx1">
+                    <a:tint val="75000"/>
+                  </a:schemeClr>
+                </a:solidFill>
+                <a:latin typeface="+mn-lt"/>
+                <a:cs typeface="+mn-cs"/>
+              </a:defRPr>
+            </a:lvl1pPr>
+          </a:lstStyle>
+          <a:p>
+            <a:pPr>
+              <a:defRPr/>
+            </a:pPr>
+            <a:fld id="{ABFE99C4-9921-4EC1-B89D-4BB7C5D58CB9}" type="slidenum">
               <a:rPr lang="en-US"/>
               <a:pPr>
                 <a:defRPr/>
@@ -3662,7 +3590,7 @@
   </p:sldLayoutIdLst>
   <p:txStyles>
     <p:titleStyle>
-      <a:lvl1pPr algn="ctr" defTabSz="457200" rtl="0" eaLnBrk="0" fontAlgn="base" hangingPunct="0">
+      <a:lvl1pPr algn="ctr" defTabSz="457200" rtl="0" fontAlgn="base">
         <a:spcBef>
           <a:spcPct val="0"/>
         </a:spcBef>
@@ -3678,7 +3606,7 @@
           <a:cs typeface="+mj-cs"/>
         </a:defRPr>
       </a:lvl1pPr>
-      <a:lvl2pPr algn="ctr" defTabSz="457200" rtl="0" eaLnBrk="0" fontAlgn="base" hangingPunct="0">
+      <a:lvl2pPr algn="ctr" defTabSz="457200" rtl="0" fontAlgn="base">
         <a:spcBef>
           <a:spcPct val="0"/>
         </a:spcBef>
@@ -3692,7 +3620,7 @@
           <a:latin typeface="Calibri" pitchFamily="34" charset="0"/>
         </a:defRPr>
       </a:lvl2pPr>
-      <a:lvl3pPr algn="ctr" defTabSz="457200" rtl="0" eaLnBrk="0" fontAlgn="base" hangingPunct="0">
+      <a:lvl3pPr algn="ctr" defTabSz="457200" rtl="0" fontAlgn="base">
         <a:spcBef>
           <a:spcPct val="0"/>
         </a:spcBef>
@@ -3706,7 +3634,7 @@
           <a:latin typeface="Calibri" pitchFamily="34" charset="0"/>
         </a:defRPr>
       </a:lvl3pPr>
-      <a:lvl4pPr algn="ctr" defTabSz="457200" rtl="0" eaLnBrk="0" fontAlgn="base" hangingPunct="0">
+      <a:lvl4pPr algn="ctr" defTabSz="457200" rtl="0" fontAlgn="base">
         <a:spcBef>
           <a:spcPct val="0"/>
         </a:spcBef>
@@ -3720,7 +3648,7 @@
           <a:latin typeface="Calibri" pitchFamily="34" charset="0"/>
         </a:defRPr>
       </a:lvl4pPr>
-      <a:lvl5pPr algn="ctr" defTabSz="457200" rtl="0" eaLnBrk="0" fontAlgn="base" hangingPunct="0">
+      <a:lvl5pPr algn="ctr" defTabSz="457200" rtl="0" fontAlgn="base">
         <a:spcBef>
           <a:spcPct val="0"/>
         </a:spcBef>
@@ -3792,7 +3720,7 @@
       </a:lvl9pPr>
     </p:titleStyle>
     <p:bodyStyle>
-      <a:lvl1pPr marL="342900" indent="-342900" algn="l" defTabSz="457200" rtl="0" eaLnBrk="0" fontAlgn="base" hangingPunct="0">
+      <a:lvl1pPr marL="342900" indent="-342900" algn="l" defTabSz="457200" rtl="0" fontAlgn="base">
         <a:spcBef>
           <a:spcPct val="20000"/>
         </a:spcBef>
@@ -3810,7 +3738,7 @@
           <a:cs typeface="+mn-cs"/>
         </a:defRPr>
       </a:lvl1pPr>
-      <a:lvl2pPr marL="742950" indent="-285750" algn="l" defTabSz="457200" rtl="0" eaLnBrk="0" fontAlgn="base" hangingPunct="0">
+      <a:lvl2pPr marL="742950" indent="-285750" algn="l" defTabSz="457200" rtl="0" fontAlgn="base">
         <a:spcBef>
           <a:spcPct val="20000"/>
         </a:spcBef>
@@ -3828,7 +3756,7 @@
           <a:cs typeface="+mn-cs"/>
         </a:defRPr>
       </a:lvl2pPr>
-      <a:lvl3pPr marL="1143000" indent="-228600" algn="l" defTabSz="457200" rtl="0" eaLnBrk="0" fontAlgn="base" hangingPunct="0">
+      <a:lvl3pPr marL="1143000" indent="-228600" algn="l" defTabSz="457200" rtl="0" fontAlgn="base">
         <a:spcBef>
           <a:spcPct val="20000"/>
         </a:spcBef>
@@ -3846,7 +3774,7 @@
           <a:cs typeface="+mn-cs"/>
         </a:defRPr>
       </a:lvl3pPr>
-      <a:lvl4pPr marL="1600200" indent="-228600" algn="l" defTabSz="457200" rtl="0" eaLnBrk="0" fontAlgn="base" hangingPunct="0">
+      <a:lvl4pPr marL="1600200" indent="-228600" algn="l" defTabSz="457200" rtl="0" fontAlgn="base">
         <a:spcBef>
           <a:spcPct val="20000"/>
         </a:spcBef>
@@ -3864,7 +3792,7 @@
           <a:cs typeface="+mn-cs"/>
         </a:defRPr>
       </a:lvl4pPr>
-      <a:lvl5pPr marL="2057400" indent="-228600" algn="l" defTabSz="457200" rtl="0" eaLnBrk="0" fontAlgn="base" hangingPunct="0">
+      <a:lvl5pPr marL="2057400" indent="-228600" algn="l" defTabSz="457200" rtl="0" fontAlgn="base">
         <a:spcBef>
           <a:spcPct val="20000"/>
         </a:spcBef>
@@ -4061,23 +3989,21 @@
       </p:grpSpPr>
       <p:grpSp>
         <p:nvGrpSpPr>
-          <p:cNvPr id="14337" name="Group 12"/>
-          <p:cNvGrpSpPr>
-            <a:grpSpLocks/>
-          </p:cNvGrpSpPr>
+          <p:cNvPr id="13" name="Group 12"/>
+          <p:cNvGrpSpPr/>
           <p:nvPr/>
         </p:nvGrpSpPr>
-        <p:grpSpPr bwMode="auto">
+        <p:grpSpPr>
           <a:xfrm>
-            <a:off x="552450" y="400050"/>
-            <a:ext cx="2913063" cy="5626100"/>
+            <a:off x="552215" y="400243"/>
+            <a:ext cx="2913470" cy="5626206"/>
             <a:chOff x="298217" y="400243"/>
             <a:chExt cx="2913470" cy="5626206"/>
           </a:xfrm>
         </p:grpSpPr>
         <p:sp>
           <p:nvSpPr>
-            <p:cNvPr id="14360" name="TextBox 30"/>
+            <p:cNvPr id="13323" name="TextBox 30"/>
             <p:cNvSpPr txBox="1">
               <a:spLocks noChangeArrowheads="1"/>
             </p:cNvSpPr>
@@ -4106,7 +4032,7 @@
             <a:lstStyle/>
             <a:p>
               <a:r>
-                <a:rPr lang="en-US">
+                <a:rPr lang="en-US" dirty="0">
                   <a:latin typeface="Calibri" pitchFamily="34" charset="0"/>
                 </a:rPr>
                 <a:t>HashSet</a:t>
@@ -4122,8 +4048,8 @@
           </p:nvSpPr>
           <p:spPr>
             <a:xfrm>
-              <a:off x="1077789" y="1816320"/>
-              <a:ext cx="2133898" cy="609611"/>
+              <a:off x="1078087" y="1816101"/>
+              <a:ext cx="2133600" cy="609600"/>
             </a:xfrm>
             <a:prstGeom prst="rect">
               <a:avLst/>
@@ -4178,8 +4104,8 @@
           </p:nvSpPr>
           <p:spPr>
             <a:xfrm>
-              <a:off x="391893" y="765375"/>
-              <a:ext cx="2133898" cy="611200"/>
+              <a:off x="392287" y="764659"/>
+              <a:ext cx="2133600" cy="612648"/>
             </a:xfrm>
             <a:prstGeom prst="rect">
               <a:avLst/>
@@ -4238,8 +4164,8 @@
           </p:nvCxnSpPr>
           <p:spPr>
             <a:xfrm rot="16200000" flipH="1">
-              <a:off x="588816" y="1632152"/>
-              <a:ext cx="750901" cy="227045"/>
+              <a:off x="588367" y="1631180"/>
+              <a:ext cx="751371" cy="228069"/>
             </a:xfrm>
             <a:prstGeom prst="bentConnector2">
               <a:avLst/>
@@ -4268,7 +4194,7 @@
         </p:cxnSp>
         <p:sp>
           <p:nvSpPr>
-            <p:cNvPr id="14364" name="TextBox 31"/>
+            <p:cNvPr id="13324" name="TextBox 31"/>
             <p:cNvSpPr txBox="1">
               <a:spLocks noChangeArrowheads="1"/>
             </p:cNvSpPr>
@@ -4297,7 +4223,7 @@
             <a:lstStyle/>
             <a:p>
               <a:r>
-                <a:rPr lang="en-US">
+                <a:rPr lang="en-US" dirty="0">
                   <a:latin typeface="Calibri" pitchFamily="34" charset="0"/>
                 </a:rPr>
                 <a:t>HashMap</a:t>
@@ -4307,7 +4233,7 @@
         </p:sp>
         <p:sp>
           <p:nvSpPr>
-            <p:cNvPr id="14365" name="TextBox 32"/>
+            <p:cNvPr id="13325" name="TextBox 32"/>
             <p:cNvSpPr txBox="1">
               <a:spLocks noChangeArrowheads="1"/>
             </p:cNvSpPr>
@@ -4336,11 +4262,14 @@
             <a:lstStyle/>
             <a:p>
               <a:r>
-                <a:rPr lang="en-US">
+                <a:rPr lang="en-US" dirty="0" smtClean="0">
                   <a:latin typeface="Calibri" pitchFamily="34" charset="0"/>
                 </a:rPr>
                 <a:t>Object[]</a:t>
               </a:r>
+              <a:endParaRPr lang="en-US" dirty="0">
+                <a:latin typeface="Calibri" pitchFamily="34" charset="0"/>
+              </a:endParaRPr>
             </a:p>
           </p:txBody>
         </p:sp>
@@ -4352,8 +4281,8 @@
           </p:nvSpPr>
           <p:spPr>
             <a:xfrm>
-              <a:off x="1763685" y="2956166"/>
-              <a:ext cx="612861" cy="708038"/>
+              <a:off x="1763887" y="2955925"/>
+              <a:ext cx="612775" cy="708218"/>
             </a:xfrm>
             <a:prstGeom prst="rect">
               <a:avLst/>
@@ -4408,8 +4337,8 @@
           </p:nvSpPr>
           <p:spPr>
             <a:xfrm>
-              <a:off x="1763685" y="3664204"/>
-              <a:ext cx="612861" cy="146053"/>
+              <a:off x="1763888" y="3664143"/>
+              <a:ext cx="612775" cy="145857"/>
             </a:xfrm>
             <a:prstGeom prst="rect">
               <a:avLst/>
@@ -4466,8 +4395,8 @@
           </p:nvCxnSpPr>
           <p:spPr>
             <a:xfrm rot="16200000" flipH="1">
-              <a:off x="1213592" y="2760093"/>
-              <a:ext cx="871554" cy="228632"/>
+              <a:off x="1214035" y="2760182"/>
+              <a:ext cx="871634" cy="228069"/>
             </a:xfrm>
             <a:prstGeom prst="bentConnector2">
               <a:avLst/>
@@ -4502,8 +4431,8 @@
           </p:nvSpPr>
           <p:spPr>
             <a:xfrm>
-              <a:off x="1760509" y="3816607"/>
-              <a:ext cx="612861" cy="146053"/>
+              <a:off x="1760712" y="3816543"/>
+              <a:ext cx="612775" cy="145857"/>
             </a:xfrm>
             <a:prstGeom prst="rect">
               <a:avLst/>
@@ -4558,8 +4487,8 @@
           </p:nvSpPr>
           <p:spPr>
             <a:xfrm>
-              <a:off x="1760509" y="3962660"/>
-              <a:ext cx="612861" cy="146053"/>
+              <a:off x="1760712" y="3962400"/>
+              <a:ext cx="612775" cy="145857"/>
             </a:xfrm>
             <a:prstGeom prst="rect">
               <a:avLst/>
@@ -4614,8 +4543,8 @@
           </p:nvSpPr>
           <p:spPr>
             <a:xfrm>
-              <a:off x="1763685" y="4116651"/>
-              <a:ext cx="612861" cy="146053"/>
+              <a:off x="1763887" y="4116543"/>
+              <a:ext cx="612775" cy="145857"/>
             </a:xfrm>
             <a:prstGeom prst="rect">
               <a:avLst/>
@@ -4670,8 +4599,8 @@
           </p:nvSpPr>
           <p:spPr>
             <a:xfrm>
-              <a:off x="1763685" y="4267466"/>
-              <a:ext cx="612861" cy="146053"/>
+              <a:off x="1763888" y="4267200"/>
+              <a:ext cx="612775" cy="145857"/>
             </a:xfrm>
             <a:prstGeom prst="rect">
               <a:avLst/>
@@ -4726,8 +4655,8 @@
           </p:nvSpPr>
           <p:spPr>
             <a:xfrm>
-              <a:off x="1763685" y="4413519"/>
-              <a:ext cx="612861" cy="146053"/>
+              <a:off x="1763887" y="4413057"/>
+              <a:ext cx="612775" cy="145857"/>
             </a:xfrm>
             <a:prstGeom prst="rect">
               <a:avLst/>
@@ -4782,8 +4711,8 @@
           </p:nvSpPr>
           <p:spPr>
             <a:xfrm>
-              <a:off x="1763685" y="4559571"/>
-              <a:ext cx="612861" cy="144466"/>
+              <a:off x="1763887" y="4558914"/>
+              <a:ext cx="612775" cy="145857"/>
             </a:xfrm>
             <a:prstGeom prst="rect">
               <a:avLst/>
@@ -4838,8 +4767,8 @@
           </p:nvSpPr>
           <p:spPr>
             <a:xfrm>
-              <a:off x="1760509" y="4704037"/>
-              <a:ext cx="612861" cy="146053"/>
+              <a:off x="1760712" y="4704771"/>
+              <a:ext cx="612775" cy="145857"/>
             </a:xfrm>
             <a:prstGeom prst="rect">
               <a:avLst/>
@@ -4894,8 +4823,8 @@
           </p:nvSpPr>
           <p:spPr>
             <a:xfrm>
-              <a:off x="1760509" y="4850090"/>
-              <a:ext cx="612861" cy="146053"/>
+              <a:off x="1760712" y="4850628"/>
+              <a:ext cx="612775" cy="145857"/>
             </a:xfrm>
             <a:prstGeom prst="rect">
               <a:avLst/>
@@ -4950,8 +4879,8 @@
           </p:nvSpPr>
           <p:spPr>
             <a:xfrm>
-              <a:off x="1760509" y="4996143"/>
-              <a:ext cx="612861" cy="146053"/>
+              <a:off x="1760712" y="4996485"/>
+              <a:ext cx="612775" cy="145857"/>
             </a:xfrm>
             <a:prstGeom prst="rect">
               <a:avLst/>
@@ -5006,8 +4935,8 @@
           </p:nvSpPr>
           <p:spPr>
             <a:xfrm>
-              <a:off x="1760509" y="5151721"/>
-              <a:ext cx="612861" cy="146053"/>
+              <a:off x="1760712" y="5151307"/>
+              <a:ext cx="612775" cy="145857"/>
             </a:xfrm>
             <a:prstGeom prst="rect">
               <a:avLst/>
@@ -5062,8 +4991,8 @@
           </p:nvSpPr>
           <p:spPr>
             <a:xfrm>
-              <a:off x="1760509" y="5297773"/>
-              <a:ext cx="612861" cy="144465"/>
+              <a:off x="1760712" y="5297164"/>
+              <a:ext cx="612775" cy="145857"/>
             </a:xfrm>
             <a:prstGeom prst="rect">
               <a:avLst/>
@@ -5118,8 +5047,8 @@
           </p:nvSpPr>
           <p:spPr>
             <a:xfrm>
-              <a:off x="1760509" y="5442238"/>
-              <a:ext cx="612861" cy="146053"/>
+              <a:off x="1760712" y="5443021"/>
+              <a:ext cx="612775" cy="145857"/>
             </a:xfrm>
             <a:prstGeom prst="rect">
               <a:avLst/>
@@ -5174,8 +5103,8 @@
           </p:nvSpPr>
           <p:spPr>
             <a:xfrm>
-              <a:off x="1760509" y="5588291"/>
-              <a:ext cx="612861" cy="146053"/>
+              <a:off x="1760712" y="5588878"/>
+              <a:ext cx="612775" cy="145857"/>
             </a:xfrm>
             <a:prstGeom prst="rect">
               <a:avLst/>
@@ -5230,8 +5159,8 @@
           </p:nvSpPr>
           <p:spPr>
             <a:xfrm>
-              <a:off x="1760509" y="5734343"/>
-              <a:ext cx="612861" cy="146053"/>
+              <a:off x="1760712" y="5734735"/>
+              <a:ext cx="612775" cy="145857"/>
             </a:xfrm>
             <a:prstGeom prst="rect">
               <a:avLst/>
@@ -5286,8 +5215,8 @@
           </p:nvSpPr>
           <p:spPr>
             <a:xfrm>
-              <a:off x="1760509" y="5880396"/>
-              <a:ext cx="612861" cy="146053"/>
+              <a:off x="1760712" y="5880592"/>
+              <a:ext cx="612775" cy="145857"/>
             </a:xfrm>
             <a:prstGeom prst="rect">
               <a:avLst/>
@@ -5337,16 +5266,14 @@
       </p:grpSp>
       <p:grpSp>
         <p:nvGrpSpPr>
-          <p:cNvPr id="14338" name="Group 10"/>
-          <p:cNvGrpSpPr>
-            <a:grpSpLocks/>
-          </p:cNvGrpSpPr>
+          <p:cNvPr id="11" name="Group 10"/>
+          <p:cNvGrpSpPr/>
           <p:nvPr/>
         </p:nvGrpSpPr>
-        <p:grpSpPr bwMode="auto">
+        <p:grpSpPr>
           <a:xfrm>
-            <a:off x="6391275" y="401638"/>
-            <a:ext cx="2227263" cy="3595687"/>
+            <a:off x="6391239" y="402131"/>
+            <a:ext cx="2227670" cy="3594447"/>
             <a:chOff x="3286819" y="402131"/>
             <a:chExt cx="2227670" cy="3594447"/>
           </a:xfrm>
@@ -5359,8 +5286,8 @@
           </p:nvSpPr>
           <p:spPr>
             <a:xfrm>
-              <a:off x="3380499" y="767130"/>
-              <a:ext cx="2133990" cy="612564"/>
+              <a:off x="3380889" y="766547"/>
+              <a:ext cx="2133600" cy="612648"/>
             </a:xfrm>
             <a:prstGeom prst="rect">
               <a:avLst/>
@@ -5419,8 +5346,8 @@
           </p:nvCxnSpPr>
           <p:spPr>
             <a:xfrm rot="16200000" flipH="1">
-              <a:off x="3556952" y="1654176"/>
-              <a:ext cx="791890" cy="227054"/>
+              <a:off x="3555745" y="1654291"/>
+              <a:ext cx="792853" cy="227103"/>
             </a:xfrm>
             <a:prstGeom prst="bentConnector2">
               <a:avLst/>
@@ -5449,7 +5376,7 @@
         </p:cxnSp>
         <p:sp>
           <p:nvSpPr>
-            <p:cNvPr id="14347" name="TextBox 30"/>
+            <p:cNvPr id="78" name="TextBox 30"/>
             <p:cNvSpPr txBox="1">
               <a:spLocks noChangeArrowheads="1"/>
             </p:cNvSpPr>
@@ -5478,17 +5405,20 @@
             <a:lstStyle/>
             <a:p>
               <a:r>
-                <a:rPr lang="en-US">
+                <a:rPr lang="en-US" dirty="0" smtClean="0">
                   <a:latin typeface="Calibri" pitchFamily="34" charset="0"/>
                 </a:rPr>
                 <a:t>ArrayList</a:t>
               </a:r>
+              <a:endParaRPr lang="en-US" dirty="0">
+                <a:latin typeface="Calibri" pitchFamily="34" charset="0"/>
+              </a:endParaRPr>
             </a:p>
           </p:txBody>
         </p:sp>
         <p:sp>
           <p:nvSpPr>
-            <p:cNvPr id="14348" name="TextBox 32"/>
+            <p:cNvPr id="89" name="TextBox 32"/>
             <p:cNvSpPr txBox="1">
               <a:spLocks noChangeArrowheads="1"/>
             </p:cNvSpPr>
@@ -5517,11 +5447,14 @@
             <a:lstStyle/>
             <a:p>
               <a:r>
-                <a:rPr lang="en-US">
+                <a:rPr lang="en-US" dirty="0" smtClean="0">
                   <a:latin typeface="Calibri" pitchFamily="34" charset="0"/>
                 </a:rPr>
                 <a:t>Object[]</a:t>
               </a:r>
+              <a:endParaRPr lang="en-US" dirty="0">
+                <a:latin typeface="Calibri" pitchFamily="34" charset="0"/>
+              </a:endParaRPr>
             </a:p>
           </p:txBody>
         </p:sp>
@@ -5533,8 +5466,8 @@
           </p:nvSpPr>
           <p:spPr>
             <a:xfrm>
-              <a:off x="4066424" y="1809757"/>
-              <a:ext cx="611299" cy="709368"/>
+              <a:off x="4065723" y="1810161"/>
+              <a:ext cx="612775" cy="708218"/>
             </a:xfrm>
             <a:prstGeom prst="rect">
               <a:avLst/>
@@ -5589,8 +5522,8 @@
           </p:nvSpPr>
           <p:spPr>
             <a:xfrm>
-              <a:off x="4066424" y="2519126"/>
-              <a:ext cx="611299" cy="144412"/>
+              <a:off x="4065724" y="2518379"/>
+              <a:ext cx="612775" cy="145857"/>
             </a:xfrm>
             <a:prstGeom prst="rect">
               <a:avLst/>
@@ -5645,8 +5578,8 @@
           </p:nvSpPr>
           <p:spPr>
             <a:xfrm>
-              <a:off x="4063249" y="2671473"/>
-              <a:ext cx="611299" cy="144412"/>
+              <a:off x="4062548" y="2670779"/>
+              <a:ext cx="612775" cy="145857"/>
             </a:xfrm>
             <a:prstGeom prst="rect">
               <a:avLst/>
@@ -5701,8 +5634,8 @@
           </p:nvSpPr>
           <p:spPr>
             <a:xfrm>
-              <a:off x="4063249" y="2815885"/>
-              <a:ext cx="611299" cy="146000"/>
+              <a:off x="4062548" y="2816636"/>
+              <a:ext cx="612775" cy="145857"/>
             </a:xfrm>
             <a:prstGeom prst="rect">
               <a:avLst/>
@@ -5757,8 +5690,8 @@
           </p:nvSpPr>
           <p:spPr>
             <a:xfrm>
-              <a:off x="4066424" y="2971407"/>
-              <a:ext cx="611299" cy="146000"/>
+              <a:off x="4065723" y="2970779"/>
+              <a:ext cx="612775" cy="145857"/>
             </a:xfrm>
             <a:prstGeom prst="rect">
               <a:avLst/>
@@ -5813,8 +5746,8 @@
           </p:nvSpPr>
           <p:spPr>
             <a:xfrm>
-              <a:off x="4066424" y="3122168"/>
-              <a:ext cx="611299" cy="144412"/>
+              <a:off x="4065724" y="3121436"/>
+              <a:ext cx="612775" cy="145857"/>
             </a:xfrm>
             <a:prstGeom prst="rect">
               <a:avLst/>
@@ -5869,8 +5802,8 @@
           </p:nvSpPr>
           <p:spPr>
             <a:xfrm>
-              <a:off x="4066424" y="3266580"/>
-              <a:ext cx="611299" cy="146000"/>
+              <a:off x="4065723" y="3267293"/>
+              <a:ext cx="612775" cy="145857"/>
             </a:xfrm>
             <a:prstGeom prst="rect">
               <a:avLst/>
@@ -5925,8 +5858,8 @@
           </p:nvSpPr>
           <p:spPr>
             <a:xfrm>
-              <a:off x="4066424" y="3412579"/>
-              <a:ext cx="611299" cy="146000"/>
+              <a:off x="4065723" y="3413150"/>
+              <a:ext cx="612775" cy="145857"/>
             </a:xfrm>
             <a:prstGeom prst="rect">
               <a:avLst/>
@@ -5981,8 +5914,8 @@
           </p:nvSpPr>
           <p:spPr>
             <a:xfrm>
-              <a:off x="4063249" y="3558579"/>
-              <a:ext cx="611299" cy="146000"/>
+              <a:off x="4062548" y="3559007"/>
+              <a:ext cx="612775" cy="145857"/>
             </a:xfrm>
             <a:prstGeom prst="rect">
               <a:avLst/>
@@ -6037,8 +5970,8 @@
           </p:nvSpPr>
           <p:spPr>
             <a:xfrm>
-              <a:off x="4063249" y="3704579"/>
-              <a:ext cx="611299" cy="146000"/>
+              <a:off x="4062548" y="3704864"/>
+              <a:ext cx="612775" cy="145857"/>
             </a:xfrm>
             <a:prstGeom prst="rect">
               <a:avLst/>
@@ -6093,8 +6026,8 @@
           </p:nvSpPr>
           <p:spPr>
             <a:xfrm>
-              <a:off x="4063249" y="3850578"/>
-              <a:ext cx="611299" cy="146000"/>
+              <a:off x="4062548" y="3850721"/>
+              <a:ext cx="612775" cy="145857"/>
             </a:xfrm>
             <a:prstGeom prst="rect">
               <a:avLst/>
@@ -6150,7 +6083,7 @@
         </p:nvSpPr>
         <p:spPr>
           <a:xfrm>
-            <a:off x="4913313" y="5454650"/>
+            <a:off x="4913487" y="5453946"/>
             <a:ext cx="2133600" cy="609600"/>
           </a:xfrm>
           <a:prstGeom prst="rect">
@@ -6206,8 +6139,8 @@
         </p:nvSpPr>
         <p:spPr>
           <a:xfrm>
-            <a:off x="4227513" y="4402138"/>
-            <a:ext cx="2133600" cy="612775"/>
+            <a:off x="4227687" y="4402504"/>
+            <a:ext cx="2133600" cy="612648"/>
           </a:xfrm>
           <a:prstGeom prst="rect">
             <a:avLst/>
@@ -6266,8 +6199,8 @@
         </p:nvCxnSpPr>
         <p:spPr>
           <a:xfrm rot="16200000" flipH="1">
-            <a:off x="4422775" y="5268913"/>
-            <a:ext cx="752475" cy="228600"/>
+            <a:off x="4423767" y="5269025"/>
+            <a:ext cx="751371" cy="228069"/>
           </a:xfrm>
           <a:prstGeom prst="bentConnector2">
             <a:avLst/>
@@ -6296,7 +6229,7 @@
       </p:cxnSp>
       <p:sp>
         <p:nvSpPr>
-          <p:cNvPr id="14342" name="TextBox 30"/>
+          <p:cNvPr id="129" name="TextBox 30"/>
           <p:cNvSpPr txBox="1">
             <a:spLocks noChangeArrowheads="1"/>
           </p:cNvSpPr>
@@ -6304,8 +6237,8 @@
         </p:nvSpPr>
         <p:spPr bwMode="auto">
           <a:xfrm>
-            <a:off x="4133850" y="4038600"/>
-            <a:ext cx="1114425" cy="368300"/>
+            <a:off x="4133617" y="4038088"/>
+            <a:ext cx="1114646" cy="369332"/>
           </a:xfrm>
           <a:prstGeom prst="rect">
             <a:avLst/>
@@ -6325,17 +6258,20 @@
           <a:lstStyle/>
           <a:p>
             <a:r>
-              <a:rPr lang="en-US">
+              <a:rPr lang="en-US" dirty="0" smtClean="0">
                 <a:latin typeface="Calibri" pitchFamily="34" charset="0"/>
               </a:rPr>
               <a:t>LinkedList</a:t>
             </a:r>
-          </a:p>
-        </p:txBody>
-      </p:sp>
-      <p:sp>
-        <p:nvSpPr>
-          <p:cNvPr id="14343" name="TextBox 31"/>
+            <a:endParaRPr lang="en-US" dirty="0">
+              <a:latin typeface="Calibri" pitchFamily="34" charset="0"/>
+            </a:endParaRPr>
+          </a:p>
+        </p:txBody>
+      </p:sp>
+      <p:sp>
+        <p:nvSpPr>
+          <p:cNvPr id="130" name="TextBox 31"/>
           <p:cNvSpPr txBox="1">
             <a:spLocks noChangeArrowheads="1"/>
           </p:cNvSpPr>
@@ -6343,8 +6279,8 @@
         </p:nvSpPr>
         <p:spPr bwMode="auto">
           <a:xfrm>
-            <a:off x="4816475" y="5086350"/>
-            <a:ext cx="1727200" cy="368300"/>
+            <a:off x="4816543" y="5085645"/>
+            <a:ext cx="1727907" cy="369332"/>
           </a:xfrm>
           <a:prstGeom prst="rect">
             <a:avLst/>
@@ -6364,11 +6300,14 @@
           <a:lstStyle/>
           <a:p>
             <a:r>
-              <a:rPr lang="en-US">
+              <a:rPr lang="en-US" dirty="0" smtClean="0">
                 <a:latin typeface="Calibri" pitchFamily="34" charset="0"/>
               </a:rPr>
               <a:t>LinkedList$Entry</a:t>
             </a:r>
+            <a:endParaRPr lang="en-US" dirty="0">
+              <a:latin typeface="Calibri" pitchFamily="34" charset="0"/>
+            </a:endParaRPr>
           </a:p>
         </p:txBody>
       </p:sp>
@@ -6383,7 +6322,7 @@
         </p:nvCxnSpPr>
         <p:spPr>
           <a:xfrm rot="5400000" flipH="1" flipV="1">
-            <a:off x="6361113" y="5378450"/>
+            <a:off x="6361287" y="5377746"/>
             <a:ext cx="304800" cy="1066800"/>
           </a:xfrm>
           <a:prstGeom prst="bentConnector4">
@@ -6415,121 +6354,6 @@
           </a:fontRef>
         </p:style>
       </p:cxnSp>
-      <p:sp>
-        <p:nvSpPr>
-          <p:cNvPr id="14385" name="Rectangle 35"/>
-          <p:cNvSpPr>
-            <a:spLocks noChangeArrowheads="1"/>
-          </p:cNvSpPr>
-          <p:nvPr/>
-        </p:nvSpPr>
-        <p:spPr bwMode="auto">
-          <a:xfrm>
-            <a:off x="7018338" y="5275263"/>
-            <a:ext cx="1919287" cy="368300"/>
-          </a:xfrm>
-          <a:prstGeom prst="rect">
-            <a:avLst/>
-          </a:prstGeom>
-          <a:noFill/>
-          <a:ln w="9525">
-            <a:noFill/>
-            <a:miter lim="800000"/>
-            <a:headEnd/>
-            <a:tailEnd/>
-          </a:ln>
-        </p:spPr>
-        <p:txBody>
-          <a:bodyPr/>
-          <a:lstStyle/>
-          <a:p>
-            <a:r>
-              <a:rPr lang="en-US" i="1">
-                <a:latin typeface="Calibri" pitchFamily="34" charset="0"/>
-              </a:rPr>
-              <a:t>Sentinel</a:t>
-            </a:r>
-          </a:p>
-        </p:txBody>
-      </p:sp>
-      <p:sp>
-        <p:nvSpPr>
-          <p:cNvPr id="14386" name="Rectangle 37"/>
-          <p:cNvSpPr>
-            <a:spLocks noChangeArrowheads="1"/>
-          </p:cNvSpPr>
-          <p:nvPr/>
-        </p:nvSpPr>
-        <p:spPr bwMode="auto">
-          <a:xfrm>
-            <a:off x="71438" y="4452938"/>
-            <a:ext cx="1993900" cy="366712"/>
-          </a:xfrm>
-          <a:prstGeom prst="rect">
-            <a:avLst/>
-          </a:prstGeom>
-          <a:noFill/>
-          <a:ln w="9525">
-            <a:noFill/>
-            <a:miter lim="800000"/>
-            <a:headEnd/>
-            <a:tailEnd/>
-          </a:ln>
-        </p:spPr>
-        <p:txBody>
-          <a:bodyPr>
-            <a:spAutoFit/>
-          </a:bodyPr>
-          <a:lstStyle/>
-          <a:p>
-            <a:r>
-              <a:rPr lang="en-US" i="1">
-                <a:latin typeface="Calibri" pitchFamily="34" charset="0"/>
-              </a:rPr>
-              <a:t>Default capacity 16</a:t>
-            </a:r>
-          </a:p>
-        </p:txBody>
-      </p:sp>
-      <p:sp>
-        <p:nvSpPr>
-          <p:cNvPr id="14387" name="Rectangle 37"/>
-          <p:cNvSpPr>
-            <a:spLocks noChangeArrowheads="1"/>
-          </p:cNvSpPr>
-          <p:nvPr/>
-        </p:nvSpPr>
-        <p:spPr bwMode="auto">
-          <a:xfrm>
-            <a:off x="5184775" y="3114675"/>
-            <a:ext cx="2009775" cy="366713"/>
-          </a:xfrm>
-          <a:prstGeom prst="rect">
-            <a:avLst/>
-          </a:prstGeom>
-          <a:noFill/>
-          <a:ln w="9525">
-            <a:noFill/>
-            <a:miter lim="800000"/>
-            <a:headEnd/>
-            <a:tailEnd/>
-          </a:ln>
-        </p:spPr>
-        <p:txBody>
-          <a:bodyPr>
-            <a:spAutoFit/>
-          </a:bodyPr>
-          <a:lstStyle/>
-          <a:p>
-            <a:r>
-              <a:rPr lang="en-US" i="1">
-                <a:latin typeface="Calibri" pitchFamily="34" charset="0"/>
-              </a:rPr>
-              <a:t>Default capacity 10</a:t>
-            </a:r>
-          </a:p>
-        </p:txBody>
-      </p:sp>
     </p:spTree>
   </p:cSld>
   <p:clrMapOvr>

</xml_diff>

<commit_message>
One-to-many Relationships: Updated Figures to change A$B notation to A.B.
</commit_message>
<xml_diff>
--- a/part1/Figures/collections/inside-empty.pptx
+++ b/part1/Figures/collections/inside-empty.pptx
@@ -222,7 +222,7 @@
           <a:p>
             <a:fld id="{63399E6A-A389-3547-948A-FA1167BEF3D4}" type="datetimeFigureOut">
               <a:rPr lang="en-US" smtClean="0"/>
-              <a:t>7/6/12</a:t>
+              <a:t>6/15/13</a:t>
             </a:fld>
             <a:endParaRPr lang="en-US" dirty="0"/>
           </a:p>
@@ -765,7 +765,7 @@
               <a:pPr>
                 <a:defRPr/>
               </a:pPr>
-              <a:t>7/6/12</a:t>
+              <a:t>6/15/13</a:t>
             </a:fld>
             <a:endParaRPr lang="en-US" dirty="0"/>
           </a:p>
@@ -957,7 +957,7 @@
               <a:pPr>
                 <a:defRPr/>
               </a:pPr>
-              <a:t>7/6/12</a:t>
+              <a:t>6/15/13</a:t>
             </a:fld>
             <a:endParaRPr lang="en-US" dirty="0"/>
           </a:p>
@@ -1159,7 +1159,7 @@
               <a:pPr>
                 <a:defRPr/>
               </a:pPr>
-              <a:t>7/6/12</a:t>
+              <a:t>6/15/13</a:t>
             </a:fld>
             <a:endParaRPr lang="en-US" dirty="0"/>
           </a:p>
@@ -1351,7 +1351,7 @@
               <a:pPr>
                 <a:defRPr/>
               </a:pPr>
-              <a:t>7/6/12</a:t>
+              <a:t>6/15/13</a:t>
             </a:fld>
             <a:endParaRPr lang="en-US" dirty="0"/>
           </a:p>
@@ -1619,7 +1619,7 @@
               <a:pPr>
                 <a:defRPr/>
               </a:pPr>
-              <a:t>7/6/12</a:t>
+              <a:t>6/15/13</a:t>
             </a:fld>
             <a:endParaRPr lang="en-US" dirty="0"/>
           </a:p>
@@ -1929,7 +1929,7 @@
               <a:pPr>
                 <a:defRPr/>
               </a:pPr>
-              <a:t>7/6/12</a:t>
+              <a:t>6/15/13</a:t>
             </a:fld>
             <a:endParaRPr lang="en-US" dirty="0"/>
           </a:p>
@@ -2373,7 +2373,7 @@
               <a:pPr>
                 <a:defRPr/>
               </a:pPr>
-              <a:t>7/6/12</a:t>
+              <a:t>6/15/13</a:t>
             </a:fld>
             <a:endParaRPr lang="en-US" dirty="0"/>
           </a:p>
@@ -2513,7 +2513,7 @@
               <a:pPr>
                 <a:defRPr/>
               </a:pPr>
-              <a:t>7/6/12</a:t>
+              <a:t>6/15/13</a:t>
             </a:fld>
             <a:endParaRPr lang="en-US" dirty="0"/>
           </a:p>
@@ -2630,7 +2630,7 @@
               <a:pPr>
                 <a:defRPr/>
               </a:pPr>
-              <a:t>7/6/12</a:t>
+              <a:t>6/15/13</a:t>
             </a:fld>
             <a:endParaRPr lang="en-US" dirty="0"/>
           </a:p>
@@ -2929,7 +2929,7 @@
               <a:pPr>
                 <a:defRPr/>
               </a:pPr>
-              <a:t>7/6/12</a:t>
+              <a:t>6/15/13</a:t>
             </a:fld>
             <a:endParaRPr lang="en-US" dirty="0"/>
           </a:p>
@@ -3207,7 +3207,7 @@
               <a:pPr>
                 <a:defRPr/>
               </a:pPr>
-              <a:t>7/6/12</a:t>
+              <a:t>6/15/13</a:t>
             </a:fld>
             <a:endParaRPr lang="en-US" dirty="0"/>
           </a:p>
@@ -3463,7 +3463,7 @@
               <a:pPr>
                 <a:defRPr/>
               </a:pPr>
-              <a:t>7/6/12</a:t>
+              <a:t>6/15/13</a:t>
             </a:fld>
             <a:endParaRPr lang="en-US" dirty="0"/>
           </a:p>
@@ -6280,7 +6280,7 @@
         <p:spPr bwMode="auto">
           <a:xfrm>
             <a:off x="4816543" y="5085645"/>
-            <a:ext cx="1727907" cy="369332"/>
+            <a:ext cx="1672253" cy="369332"/>
           </a:xfrm>
           <a:prstGeom prst="rect">
             <a:avLst/>
@@ -6300,10 +6300,10 @@
           <a:lstStyle/>
           <a:p>
             <a:r>
-              <a:rPr lang="en-US" dirty="0" smtClean="0">
+              <a:rPr lang="en-US" dirty="0" err="1" smtClean="0">
                 <a:latin typeface="Calibri" pitchFamily="34" charset="0"/>
               </a:rPr>
-              <a:t>LinkedList$Entry</a:t>
+              <a:t>LinkedList.Entry</a:t>
             </a:r>
             <a:endParaRPr lang="en-US" dirty="0">
               <a:latin typeface="Calibri" pitchFamily="34" charset="0"/>

</xml_diff>